<commit_message>
Add quick-fix script for repairing workshop dependencies
- Implemented a PowerShell script to automate the repair of dependencies for Azure Function, Desktop Commander, Teams Bot, and Python projects.
- The script stops relevant processes, removes existing node modules and lock files, and reinstalls dependencies.
- Includes error handling and success messages for each component.
- Provides instructions to run the workshop after repairs are completed.
</commit_message>
<xml_diff>
--- a/docs/Copilot365-MCP-Workshop-Presentation.pptx
+++ b/docs/Copilot365-MCP-Workshop-Presentation.pptx
@@ -5,18 +5,18 @@
     <p:sldMasterId id="2147483648" r:id="rId1"/>
   </p:sldMasterIdLst>
   <p:sldIdLst>
-    <p:sldId id="256" r:id="rId7"/>
-    <p:sldId id="257" r:id="rId8"/>
-    <p:sldId id="258" r:id="rId9"/>
-    <p:sldId id="259" r:id="rId10"/>
-    <p:sldId id="260" r:id="rId11"/>
-    <p:sldId id="261" r:id="rId12"/>
-    <p:sldId id="262" r:id="rId13"/>
-    <p:sldId id="263" r:id="rId14"/>
-    <p:sldId id="264" r:id="rId15"/>
-    <p:sldId id="265" r:id="rId16"/>
-    <p:sldId id="266" r:id="rId17"/>
-    <p:sldId id="267" r:id="rId18"/>
+    <p:sldId id="256" r:id="rId2"/>
+    <p:sldId id="257" r:id="rId3"/>
+    <p:sldId id="258" r:id="rId4"/>
+    <p:sldId id="259" r:id="rId5"/>
+    <p:sldId id="260" r:id="rId6"/>
+    <p:sldId id="261" r:id="rId7"/>
+    <p:sldId id="262" r:id="rId8"/>
+    <p:sldId id="263" r:id="rId9"/>
+    <p:sldId id="264" r:id="rId10"/>
+    <p:sldId id="265" r:id="rId11"/>
+    <p:sldId id="266" r:id="rId12"/>
+    <p:sldId id="267" r:id="rId13"/>
   </p:sldIdLst>
   <p:sldSz cx="9144000" cy="6858000" type="screen4x3"/>
   <p:notesSz cx="6858000" cy="9144000"/>
@@ -115,6 +115,22 @@
       </a:defRPr>
     </a:lvl9pPr>
   </p:defaultTextStyle>
+  <p:extLst>
+    <p:ext uri="{EFAFB233-063F-42B5-8137-9DF3F51BA10A}">
+      <p15:sldGuideLst xmlns:p15="http://schemas.microsoft.com/office/powerpoint/2012/main">
+        <p15:guide id="1" orient="horz" pos="2160">
+          <p15:clr>
+            <a:srgbClr val="A4A3A4"/>
+          </p15:clr>
+        </p15:guide>
+        <p15:guide id="2" pos="2880">
+          <p15:clr>
+            <a:srgbClr val="A4A3A4"/>
+          </p15:clr>
+        </p15:guide>
+      </p15:sldGuideLst>
+    </p:ext>
+  </p:extLst>
 </p:presentation>
 </file>
 
@@ -156,10 +172,9 @@
           <a:lstStyle/>
           <a:p>
             <a:r>
-              <a:rPr lang="en-US" smtClean="0"/>
+              <a:rPr lang="en-US"/>
               <a:t>Click to edit Master title style</a:t>
             </a:r>
-            <a:endParaRPr lang="en-US"/>
           </a:p>
         </p:txBody>
       </p:sp>
@@ -275,10 +290,9 @@
           </a:lstStyle>
           <a:p>
             <a:r>
-              <a:rPr lang="en-US" smtClean="0"/>
+              <a:rPr lang="en-US"/>
               <a:t>Click to edit Master subtitle style</a:t>
             </a:r>
-            <a:endParaRPr lang="en-US"/>
           </a:p>
         </p:txBody>
       </p:sp>
@@ -299,7 +313,7 @@
           <a:p>
             <a:fld id="{5BCAD085-E8A6-8845-BD4E-CB4CCA059FC4}" type="datetimeFigureOut">
               <a:rPr lang="en-US" smtClean="0"/>
-              <a:t>1/27/13</a:t>
+              <a:t>6/9/2025</a:t>
             </a:fld>
             <a:endParaRPr lang="en-US"/>
           </a:p>
@@ -393,10 +407,9 @@
           <a:lstStyle/>
           <a:p>
             <a:r>
-              <a:rPr lang="en-US" smtClean="0"/>
+              <a:rPr lang="en-US"/>
               <a:t>Click to edit Master title style</a:t>
             </a:r>
-            <a:endParaRPr lang="en-US"/>
           </a:p>
         </p:txBody>
       </p:sp>
@@ -417,38 +430,37 @@
           <a:p>
             <a:pPr lvl="0"/>
             <a:r>
-              <a:rPr lang="en-US" smtClean="0"/>
+              <a:rPr lang="en-US"/>
               <a:t>Click to edit Master text styles</a:t>
             </a:r>
           </a:p>
           <a:p>
             <a:pPr lvl="1"/>
             <a:r>
-              <a:rPr lang="en-US" smtClean="0"/>
+              <a:rPr lang="en-US"/>
               <a:t>Second level</a:t>
             </a:r>
           </a:p>
           <a:p>
             <a:pPr lvl="2"/>
             <a:r>
-              <a:rPr lang="en-US" smtClean="0"/>
+              <a:rPr lang="en-US"/>
               <a:t>Third level</a:t>
             </a:r>
           </a:p>
           <a:p>
             <a:pPr lvl="3"/>
             <a:r>
-              <a:rPr lang="en-US" smtClean="0"/>
+              <a:rPr lang="en-US"/>
               <a:t>Fourth level</a:t>
             </a:r>
           </a:p>
           <a:p>
             <a:pPr lvl="4"/>
             <a:r>
-              <a:rPr lang="en-US" smtClean="0"/>
+              <a:rPr lang="en-US"/>
               <a:t>Fifth level</a:t>
             </a:r>
-            <a:endParaRPr lang="en-US"/>
           </a:p>
         </p:txBody>
       </p:sp>
@@ -469,7 +481,7 @@
           <a:p>
             <a:fld id="{5BCAD085-E8A6-8845-BD4E-CB4CCA059FC4}" type="datetimeFigureOut">
               <a:rPr lang="en-US" smtClean="0"/>
-              <a:t>1/27/13</a:t>
+              <a:t>6/9/2025</a:t>
             </a:fld>
             <a:endParaRPr lang="en-US"/>
           </a:p>
@@ -568,10 +580,9 @@
           <a:lstStyle/>
           <a:p>
             <a:r>
-              <a:rPr lang="en-US" smtClean="0"/>
+              <a:rPr lang="en-US"/>
               <a:t>Click to edit Master title style</a:t>
             </a:r>
-            <a:endParaRPr lang="en-US"/>
           </a:p>
         </p:txBody>
       </p:sp>
@@ -597,38 +608,37 @@
           <a:p>
             <a:pPr lvl="0"/>
             <a:r>
-              <a:rPr lang="en-US" smtClean="0"/>
+              <a:rPr lang="en-US"/>
               <a:t>Click to edit Master text styles</a:t>
             </a:r>
           </a:p>
           <a:p>
             <a:pPr lvl="1"/>
             <a:r>
-              <a:rPr lang="en-US" smtClean="0"/>
+              <a:rPr lang="en-US"/>
               <a:t>Second level</a:t>
             </a:r>
           </a:p>
           <a:p>
             <a:pPr lvl="2"/>
             <a:r>
-              <a:rPr lang="en-US" smtClean="0"/>
+              <a:rPr lang="en-US"/>
               <a:t>Third level</a:t>
             </a:r>
           </a:p>
           <a:p>
             <a:pPr lvl="3"/>
             <a:r>
-              <a:rPr lang="en-US" smtClean="0"/>
+              <a:rPr lang="en-US"/>
               <a:t>Fourth level</a:t>
             </a:r>
           </a:p>
           <a:p>
             <a:pPr lvl="4"/>
             <a:r>
-              <a:rPr lang="en-US" smtClean="0"/>
+              <a:rPr lang="en-US"/>
               <a:t>Fifth level</a:t>
             </a:r>
-            <a:endParaRPr lang="en-US"/>
           </a:p>
         </p:txBody>
       </p:sp>
@@ -649,7 +659,7 @@
           <a:p>
             <a:fld id="{5BCAD085-E8A6-8845-BD4E-CB4CCA059FC4}" type="datetimeFigureOut">
               <a:rPr lang="en-US" smtClean="0"/>
-              <a:t>1/27/13</a:t>
+              <a:t>6/9/2025</a:t>
             </a:fld>
             <a:endParaRPr lang="en-US"/>
           </a:p>
@@ -743,10 +753,9 @@
           <a:lstStyle/>
           <a:p>
             <a:r>
-              <a:rPr lang="en-US" smtClean="0"/>
+              <a:rPr lang="en-US"/>
               <a:t>Click to edit Master title style</a:t>
             </a:r>
-            <a:endParaRPr lang="en-US"/>
           </a:p>
         </p:txBody>
       </p:sp>
@@ -767,38 +776,37 @@
           <a:p>
             <a:pPr lvl="0"/>
             <a:r>
-              <a:rPr lang="en-US" smtClean="0"/>
+              <a:rPr lang="en-US"/>
               <a:t>Click to edit Master text styles</a:t>
             </a:r>
           </a:p>
           <a:p>
             <a:pPr lvl="1"/>
             <a:r>
-              <a:rPr lang="en-US" smtClean="0"/>
+              <a:rPr lang="en-US"/>
               <a:t>Second level</a:t>
             </a:r>
           </a:p>
           <a:p>
             <a:pPr lvl="2"/>
             <a:r>
-              <a:rPr lang="en-US" smtClean="0"/>
+              <a:rPr lang="en-US"/>
               <a:t>Third level</a:t>
             </a:r>
           </a:p>
           <a:p>
             <a:pPr lvl="3"/>
             <a:r>
-              <a:rPr lang="en-US" smtClean="0"/>
+              <a:rPr lang="en-US"/>
               <a:t>Fourth level</a:t>
             </a:r>
           </a:p>
           <a:p>
             <a:pPr lvl="4"/>
             <a:r>
-              <a:rPr lang="en-US" smtClean="0"/>
+              <a:rPr lang="en-US"/>
               <a:t>Fifth level</a:t>
             </a:r>
-            <a:endParaRPr lang="en-US"/>
           </a:p>
         </p:txBody>
       </p:sp>
@@ -819,7 +827,7 @@
           <a:p>
             <a:fld id="{5BCAD085-E8A6-8845-BD4E-CB4CCA059FC4}" type="datetimeFigureOut">
               <a:rPr lang="en-US" smtClean="0"/>
-              <a:t>1/27/13</a:t>
+              <a:t>6/9/2025</a:t>
             </a:fld>
             <a:endParaRPr lang="en-US"/>
           </a:p>
@@ -922,10 +930,9 @@
           </a:lstStyle>
           <a:p>
             <a:r>
-              <a:rPr lang="en-US" smtClean="0"/>
+              <a:rPr lang="en-US"/>
               <a:t>Click to edit Master title style</a:t>
             </a:r>
-            <a:endParaRPr lang="en-US"/>
           </a:p>
         </p:txBody>
       </p:sp>
@@ -1042,7 +1049,7 @@
           <a:p>
             <a:pPr lvl="0"/>
             <a:r>
-              <a:rPr lang="en-US" smtClean="0"/>
+              <a:rPr lang="en-US"/>
               <a:t>Click to edit Master text styles</a:t>
             </a:r>
           </a:p>
@@ -1065,7 +1072,7 @@
           <a:p>
             <a:fld id="{5BCAD085-E8A6-8845-BD4E-CB4CCA059FC4}" type="datetimeFigureOut">
               <a:rPr lang="en-US" smtClean="0"/>
-              <a:t>1/27/13</a:t>
+              <a:t>6/9/2025</a:t>
             </a:fld>
             <a:endParaRPr lang="en-US"/>
           </a:p>
@@ -1159,10 +1166,9 @@
           <a:lstStyle/>
           <a:p>
             <a:r>
-              <a:rPr lang="en-US" smtClean="0"/>
+              <a:rPr lang="en-US"/>
               <a:t>Click to edit Master title style</a:t>
             </a:r>
-            <a:endParaRPr lang="en-US"/>
           </a:p>
         </p:txBody>
       </p:sp>
@@ -1216,38 +1222,37 @@
           <a:p>
             <a:pPr lvl="0"/>
             <a:r>
-              <a:rPr lang="en-US" smtClean="0"/>
+              <a:rPr lang="en-US"/>
               <a:t>Click to edit Master text styles</a:t>
             </a:r>
           </a:p>
           <a:p>
             <a:pPr lvl="1"/>
             <a:r>
-              <a:rPr lang="en-US" smtClean="0"/>
+              <a:rPr lang="en-US"/>
               <a:t>Second level</a:t>
             </a:r>
           </a:p>
           <a:p>
             <a:pPr lvl="2"/>
             <a:r>
-              <a:rPr lang="en-US" smtClean="0"/>
+              <a:rPr lang="en-US"/>
               <a:t>Third level</a:t>
             </a:r>
           </a:p>
           <a:p>
             <a:pPr lvl="3"/>
             <a:r>
-              <a:rPr lang="en-US" smtClean="0"/>
+              <a:rPr lang="en-US"/>
               <a:t>Fourth level</a:t>
             </a:r>
           </a:p>
           <a:p>
             <a:pPr lvl="4"/>
             <a:r>
-              <a:rPr lang="en-US" smtClean="0"/>
+              <a:rPr lang="en-US"/>
               <a:t>Fifth level</a:t>
             </a:r>
-            <a:endParaRPr lang="en-US"/>
           </a:p>
         </p:txBody>
       </p:sp>
@@ -1301,38 +1306,37 @@
           <a:p>
             <a:pPr lvl="0"/>
             <a:r>
-              <a:rPr lang="en-US" smtClean="0"/>
+              <a:rPr lang="en-US"/>
               <a:t>Click to edit Master text styles</a:t>
             </a:r>
           </a:p>
           <a:p>
             <a:pPr lvl="1"/>
             <a:r>
-              <a:rPr lang="en-US" smtClean="0"/>
+              <a:rPr lang="en-US"/>
               <a:t>Second level</a:t>
             </a:r>
           </a:p>
           <a:p>
             <a:pPr lvl="2"/>
             <a:r>
-              <a:rPr lang="en-US" smtClean="0"/>
+              <a:rPr lang="en-US"/>
               <a:t>Third level</a:t>
             </a:r>
           </a:p>
           <a:p>
             <a:pPr lvl="3"/>
             <a:r>
-              <a:rPr lang="en-US" smtClean="0"/>
+              <a:rPr lang="en-US"/>
               <a:t>Fourth level</a:t>
             </a:r>
           </a:p>
           <a:p>
             <a:pPr lvl="4"/>
             <a:r>
-              <a:rPr lang="en-US" smtClean="0"/>
+              <a:rPr lang="en-US"/>
               <a:t>Fifth level</a:t>
             </a:r>
-            <a:endParaRPr lang="en-US"/>
           </a:p>
         </p:txBody>
       </p:sp>
@@ -1353,7 +1357,7 @@
           <a:p>
             <a:fld id="{5BCAD085-E8A6-8845-BD4E-CB4CCA059FC4}" type="datetimeFigureOut">
               <a:rPr lang="en-US" smtClean="0"/>
-              <a:t>1/27/13</a:t>
+              <a:t>6/9/2025</a:t>
             </a:fld>
             <a:endParaRPr lang="en-US"/>
           </a:p>
@@ -1451,10 +1455,9 @@
           </a:lstStyle>
           <a:p>
             <a:r>
-              <a:rPr lang="en-US" smtClean="0"/>
+              <a:rPr lang="en-US"/>
               <a:t>Click to edit Master title style</a:t>
             </a:r>
-            <a:endParaRPr lang="en-US"/>
           </a:p>
         </p:txBody>
       </p:sp>
@@ -1517,7 +1520,7 @@
           <a:p>
             <a:pPr lvl="0"/>
             <a:r>
-              <a:rPr lang="en-US" smtClean="0"/>
+              <a:rPr lang="en-US"/>
               <a:t>Click to edit Master text styles</a:t>
             </a:r>
           </a:p>
@@ -1573,38 +1576,37 @@
           <a:p>
             <a:pPr lvl="0"/>
             <a:r>
-              <a:rPr lang="en-US" smtClean="0"/>
+              <a:rPr lang="en-US"/>
               <a:t>Click to edit Master text styles</a:t>
             </a:r>
           </a:p>
           <a:p>
             <a:pPr lvl="1"/>
             <a:r>
-              <a:rPr lang="en-US" smtClean="0"/>
+              <a:rPr lang="en-US"/>
               <a:t>Second level</a:t>
             </a:r>
           </a:p>
           <a:p>
             <a:pPr lvl="2"/>
             <a:r>
-              <a:rPr lang="en-US" smtClean="0"/>
+              <a:rPr lang="en-US"/>
               <a:t>Third level</a:t>
             </a:r>
           </a:p>
           <a:p>
             <a:pPr lvl="3"/>
             <a:r>
-              <a:rPr lang="en-US" smtClean="0"/>
+              <a:rPr lang="en-US"/>
               <a:t>Fourth level</a:t>
             </a:r>
           </a:p>
           <a:p>
             <a:pPr lvl="4"/>
             <a:r>
-              <a:rPr lang="en-US" smtClean="0"/>
+              <a:rPr lang="en-US"/>
               <a:t>Fifth level</a:t>
             </a:r>
-            <a:endParaRPr lang="en-US"/>
           </a:p>
         </p:txBody>
       </p:sp>
@@ -1667,7 +1669,7 @@
           <a:p>
             <a:pPr lvl="0"/>
             <a:r>
-              <a:rPr lang="en-US" smtClean="0"/>
+              <a:rPr lang="en-US"/>
               <a:t>Click to edit Master text styles</a:t>
             </a:r>
           </a:p>
@@ -1723,38 +1725,37 @@
           <a:p>
             <a:pPr lvl="0"/>
             <a:r>
-              <a:rPr lang="en-US" smtClean="0"/>
+              <a:rPr lang="en-US"/>
               <a:t>Click to edit Master text styles</a:t>
             </a:r>
           </a:p>
           <a:p>
             <a:pPr lvl="1"/>
             <a:r>
-              <a:rPr lang="en-US" smtClean="0"/>
+              <a:rPr lang="en-US"/>
               <a:t>Second level</a:t>
             </a:r>
           </a:p>
           <a:p>
             <a:pPr lvl="2"/>
             <a:r>
-              <a:rPr lang="en-US" smtClean="0"/>
+              <a:rPr lang="en-US"/>
               <a:t>Third level</a:t>
             </a:r>
           </a:p>
           <a:p>
             <a:pPr lvl="3"/>
             <a:r>
-              <a:rPr lang="en-US" smtClean="0"/>
+              <a:rPr lang="en-US"/>
               <a:t>Fourth level</a:t>
             </a:r>
           </a:p>
           <a:p>
             <a:pPr lvl="4"/>
             <a:r>
-              <a:rPr lang="en-US" smtClean="0"/>
+              <a:rPr lang="en-US"/>
               <a:t>Fifth level</a:t>
             </a:r>
-            <a:endParaRPr lang="en-US"/>
           </a:p>
         </p:txBody>
       </p:sp>
@@ -1775,7 +1776,7 @@
           <a:p>
             <a:fld id="{5BCAD085-E8A6-8845-BD4E-CB4CCA059FC4}" type="datetimeFigureOut">
               <a:rPr lang="en-US" smtClean="0"/>
-              <a:t>1/27/13</a:t>
+              <a:t>6/9/2025</a:t>
             </a:fld>
             <a:endParaRPr lang="en-US"/>
           </a:p>
@@ -1869,10 +1870,9 @@
           <a:lstStyle/>
           <a:p>
             <a:r>
-              <a:rPr lang="en-US" smtClean="0"/>
+              <a:rPr lang="en-US"/>
               <a:t>Click to edit Master title style</a:t>
             </a:r>
-            <a:endParaRPr lang="en-US"/>
           </a:p>
         </p:txBody>
       </p:sp>
@@ -1893,7 +1893,7 @@
           <a:p>
             <a:fld id="{5BCAD085-E8A6-8845-BD4E-CB4CCA059FC4}" type="datetimeFigureOut">
               <a:rPr lang="en-US" smtClean="0"/>
-              <a:t>1/27/13</a:t>
+              <a:t>6/9/2025</a:t>
             </a:fld>
             <a:endParaRPr lang="en-US"/>
           </a:p>
@@ -1988,7 +1988,7 @@
           <a:p>
             <a:fld id="{5BCAD085-E8A6-8845-BD4E-CB4CCA059FC4}" type="datetimeFigureOut">
               <a:rPr lang="en-US" smtClean="0"/>
-              <a:t>1/27/13</a:t>
+              <a:t>6/9/2025</a:t>
             </a:fld>
             <a:endParaRPr lang="en-US"/>
           </a:p>
@@ -2091,10 +2091,9 @@
           </a:lstStyle>
           <a:p>
             <a:r>
-              <a:rPr lang="en-US" smtClean="0"/>
+              <a:rPr lang="en-US"/>
               <a:t>Click to edit Master title style</a:t>
             </a:r>
-            <a:endParaRPr lang="en-US"/>
           </a:p>
         </p:txBody>
       </p:sp>
@@ -2148,38 +2147,37 @@
           <a:p>
             <a:pPr lvl="0"/>
             <a:r>
-              <a:rPr lang="en-US" smtClean="0"/>
+              <a:rPr lang="en-US"/>
               <a:t>Click to edit Master text styles</a:t>
             </a:r>
           </a:p>
           <a:p>
             <a:pPr lvl="1"/>
             <a:r>
-              <a:rPr lang="en-US" smtClean="0"/>
+              <a:rPr lang="en-US"/>
               <a:t>Second level</a:t>
             </a:r>
           </a:p>
           <a:p>
             <a:pPr lvl="2"/>
             <a:r>
-              <a:rPr lang="en-US" smtClean="0"/>
+              <a:rPr lang="en-US"/>
               <a:t>Third level</a:t>
             </a:r>
           </a:p>
           <a:p>
             <a:pPr lvl="3"/>
             <a:r>
-              <a:rPr lang="en-US" smtClean="0"/>
+              <a:rPr lang="en-US"/>
               <a:t>Fourth level</a:t>
             </a:r>
           </a:p>
           <a:p>
             <a:pPr lvl="4"/>
             <a:r>
-              <a:rPr lang="en-US" smtClean="0"/>
+              <a:rPr lang="en-US"/>
               <a:t>Fifth level</a:t>
             </a:r>
-            <a:endParaRPr lang="en-US"/>
           </a:p>
         </p:txBody>
       </p:sp>
@@ -2242,7 +2240,7 @@
           <a:p>
             <a:pPr lvl="0"/>
             <a:r>
-              <a:rPr lang="en-US" smtClean="0"/>
+              <a:rPr lang="en-US"/>
               <a:t>Click to edit Master text styles</a:t>
             </a:r>
           </a:p>
@@ -2265,7 +2263,7 @@
           <a:p>
             <a:fld id="{5BCAD085-E8A6-8845-BD4E-CB4CCA059FC4}" type="datetimeFigureOut">
               <a:rPr lang="en-US" smtClean="0"/>
-              <a:t>1/27/13</a:t>
+              <a:t>6/9/2025</a:t>
             </a:fld>
             <a:endParaRPr lang="en-US"/>
           </a:p>
@@ -2368,10 +2366,9 @@
           </a:lstStyle>
           <a:p>
             <a:r>
-              <a:rPr lang="en-US" smtClean="0"/>
+              <a:rPr lang="en-US"/>
               <a:t>Click to edit Master title style</a:t>
             </a:r>
-            <a:endParaRPr lang="en-US"/>
           </a:p>
         </p:txBody>
       </p:sp>
@@ -2495,7 +2492,7 @@
           <a:p>
             <a:pPr lvl="0"/>
             <a:r>
-              <a:rPr lang="en-US" smtClean="0"/>
+              <a:rPr lang="en-US"/>
               <a:t>Click to edit Master text styles</a:t>
             </a:r>
           </a:p>
@@ -2518,7 +2515,7 @@
           <a:p>
             <a:fld id="{5BCAD085-E8A6-8845-BD4E-CB4CCA059FC4}" type="datetimeFigureOut">
               <a:rPr lang="en-US" smtClean="0"/>
-              <a:t>1/27/13</a:t>
+              <a:t>6/9/2025</a:t>
             </a:fld>
             <a:endParaRPr lang="en-US"/>
           </a:p>
@@ -2627,10 +2624,9 @@
           <a:lstStyle/>
           <a:p>
             <a:r>
-              <a:rPr lang="en-US" smtClean="0"/>
+              <a:rPr lang="en-US"/>
               <a:t>Click to edit Master title style</a:t>
             </a:r>
-            <a:endParaRPr lang="en-US"/>
           </a:p>
         </p:txBody>
       </p:sp>
@@ -2661,38 +2657,37 @@
           <a:p>
             <a:pPr lvl="0"/>
             <a:r>
-              <a:rPr lang="en-US" smtClean="0"/>
+              <a:rPr lang="en-US"/>
               <a:t>Click to edit Master text styles</a:t>
             </a:r>
           </a:p>
           <a:p>
             <a:pPr lvl="1"/>
             <a:r>
-              <a:rPr lang="en-US" smtClean="0"/>
+              <a:rPr lang="en-US"/>
               <a:t>Second level</a:t>
             </a:r>
           </a:p>
           <a:p>
             <a:pPr lvl="2"/>
             <a:r>
-              <a:rPr lang="en-US" smtClean="0"/>
+              <a:rPr lang="en-US"/>
               <a:t>Third level</a:t>
             </a:r>
           </a:p>
           <a:p>
             <a:pPr lvl="3"/>
             <a:r>
-              <a:rPr lang="en-US" smtClean="0"/>
+              <a:rPr lang="en-US"/>
               <a:t>Fourth level</a:t>
             </a:r>
           </a:p>
           <a:p>
             <a:pPr lvl="4"/>
             <a:r>
-              <a:rPr lang="en-US" smtClean="0"/>
+              <a:rPr lang="en-US"/>
               <a:t>Fifth level</a:t>
             </a:r>
-            <a:endParaRPr lang="en-US"/>
           </a:p>
         </p:txBody>
       </p:sp>
@@ -2731,7 +2726,7 @@
           <a:p>
             <a:fld id="{5BCAD085-E8A6-8845-BD4E-CB4CCA059FC4}" type="datetimeFigureOut">
               <a:rPr lang="en-US" smtClean="0"/>
-              <a:t>1/27/13</a:t>
+              <a:t>6/9/2025</a:t>
             </a:fld>
             <a:endParaRPr lang="en-US"/>
           </a:p>
@@ -3090,7 +3085,7 @@
 </file>
 
 <file path=ppt/slides/slide1.xml><?xml version="1.0" encoding="utf-8"?>
-<p:sld xmlns:a="http://schemas.openxmlformats.org/drawingml/2006/main" xmlns:p="http://schemas.openxmlformats.org/presentationml/2006/main" xmlns:r="http://schemas.openxmlformats.org/officeDocument/2006/relationships">
+<p:sld xmlns:a="http://schemas.openxmlformats.org/drawingml/2006/main" xmlns:r="http://schemas.openxmlformats.org/officeDocument/2006/relationships" xmlns:p="http://schemas.openxmlformats.org/presentationml/2006/main">
   <p:cSld>
     <p:spTree>
       <p:nvGrpSpPr>
@@ -3098,7 +3093,14 @@
         <p:cNvGrpSpPr/>
         <p:nvPr/>
       </p:nvGrpSpPr>
-      <p:grpSpPr/>
+      <p:grpSpPr>
+        <a:xfrm>
+          <a:off x="0" y="0"/>
+          <a:ext cx="0" cy="0"/>
+          <a:chOff x="0" y="0"/>
+          <a:chExt cx="0" cy="0"/>
+        </a:xfrm>
+      </p:grpSpPr>
       <p:sp>
         <p:nvSpPr>
           <p:cNvPr id="2" name="Title 1"/>
@@ -3160,7 +3162,7 @@
 </file>
 
 <file path=ppt/slides/slide10.xml><?xml version="1.0" encoding="utf-8"?>
-<p:sld xmlns:a="http://schemas.openxmlformats.org/drawingml/2006/main" xmlns:p="http://schemas.openxmlformats.org/presentationml/2006/main" xmlns:r="http://schemas.openxmlformats.org/officeDocument/2006/relationships">
+<p:sld xmlns:a="http://schemas.openxmlformats.org/drawingml/2006/main" xmlns:r="http://schemas.openxmlformats.org/officeDocument/2006/relationships" xmlns:p="http://schemas.openxmlformats.org/presentationml/2006/main">
   <p:cSld>
     <p:spTree>
       <p:nvGrpSpPr>
@@ -3168,7 +3170,14 @@
         <p:cNvGrpSpPr/>
         <p:nvPr/>
       </p:nvGrpSpPr>
-      <p:grpSpPr/>
+      <p:grpSpPr>
+        <a:xfrm>
+          <a:off x="0" y="0"/>
+          <a:ext cx="0" cy="0"/>
+          <a:chOff x="0" y="0"/>
+          <a:chExt cx="0" cy="0"/>
+        </a:xfrm>
+      </p:grpSpPr>
       <p:sp>
         <p:nvSpPr>
           <p:cNvPr id="2" name="Title 1"/>
@@ -3202,46 +3211,107 @@
         </p:nvSpPr>
         <p:spPr/>
         <p:txBody>
-          <a:bodyPr/>
+          <a:bodyPr>
+            <a:normAutofit fontScale="77500" lnSpcReduction="20000"/>
+          </a:bodyPr>
           <a:lstStyle/>
-          <a:p/>
-          <a:p>
-            <a:pPr>
-              <a:lnSpc>
-                <a:spcPct val="100000"/>
-              </a:lnSpc>
-            </a:pPr>
-            <a:r>
-              <a:t>☁️ Azure Tools - zarządzanie zasobami Azure</a:t>
-            </a:r>
-          </a:p>
-          <a:p>
-            <a:pPr>
-              <a:lnSpc>
-                <a:spcPct val="100000"/>
-              </a:lnSpc>
-            </a:pPr>
-            <a:r>
-              <a:t>⚡ Azure Functions - development i deployment funkcji</a:t>
-            </a:r>
-          </a:p>
-          <a:p>
-            <a:pPr>
-              <a:lnSpc>
-                <a:spcPct val="100000"/>
-              </a:lnSpc>
-            </a:pPr>
-            <a:r>
-              <a:t>📜 PowerShell - edycja skryptów PS1</a:t>
-            </a:r>
-          </a:p>
-          <a:p>
-            <a:pPr>
-              <a:lnSpc>
-                <a:spcPct val="100000"/>
-              </a:lnSpc>
-            </a:pPr>
-            <a:r>
+          <a:p>
+            <a:endParaRPr dirty="0"/>
+          </a:p>
+          <a:p>
+            <a:pPr>
+              <a:lnSpc>
+                <a:spcPct val="100000"/>
+              </a:lnSpc>
+            </a:pPr>
+            <a:r>
+              <a:rPr dirty="0"/>
+              <a:t>☁️ Azure Tools - </a:t>
+            </a:r>
+            <a:r>
+              <a:rPr dirty="0" err="1"/>
+              <a:t>zarządzanie</a:t>
+            </a:r>
+            <a:r>
+              <a:rPr dirty="0"/>
+              <a:t> </a:t>
+            </a:r>
+            <a:r>
+              <a:rPr dirty="0" err="1"/>
+              <a:t>zasobami</a:t>
+            </a:r>
+            <a:r>
+              <a:rPr dirty="0"/>
+              <a:t> Azure</a:t>
+            </a:r>
+          </a:p>
+          <a:p>
+            <a:pPr>
+              <a:lnSpc>
+                <a:spcPct val="100000"/>
+              </a:lnSpc>
+            </a:pPr>
+            <a:r>
+              <a:rPr dirty="0"/>
+              <a:t>⚡ Azure Functions - development </a:t>
+            </a:r>
+            <a:r>
+              <a:rPr dirty="0" err="1"/>
+              <a:t>i</a:t>
+            </a:r>
+            <a:r>
+              <a:rPr dirty="0"/>
+              <a:t> </a:t>
+            </a:r>
+            <a:r>
+              <a:rPr sz="1800" dirty="0"/>
+              <a:t>deployment</a:t>
+            </a:r>
+            <a:r>
+              <a:rPr dirty="0"/>
+              <a:t> </a:t>
+            </a:r>
+            <a:r>
+              <a:rPr dirty="0" err="1"/>
+              <a:t>funkcji</a:t>
+            </a:r>
+            <a:endParaRPr dirty="0"/>
+          </a:p>
+          <a:p>
+            <a:pPr>
+              <a:lnSpc>
+                <a:spcPct val="100000"/>
+              </a:lnSpc>
+            </a:pPr>
+            <a:r>
+              <a:rPr dirty="0"/>
+              <a:t>📜 PowerShell - </a:t>
+            </a:r>
+            <a:r>
+              <a:rPr dirty="0" err="1"/>
+              <a:t>edycja</a:t>
+            </a:r>
+            <a:r>
+              <a:rPr dirty="0"/>
+              <a:t> </a:t>
+            </a:r>
+            <a:r>
+              <a:rPr dirty="0" err="1"/>
+              <a:t>skryptów</a:t>
+            </a:r>
+            <a:r>
+              <a:rPr dirty="0"/>
+              <a:t> PS1</a:t>
+            </a:r>
+          </a:p>
+          <a:p>
+            <a:pPr>
+              <a:lnSpc>
+                <a:spcPct val="100000"/>
+              </a:lnSpc>
+            </a:pPr>
+            <a:r>
+              <a:rPr dirty="0"/>
               <a:t>🐍 Python - development Python MCP servers</a:t>
             </a:r>
           </a:p>
@@ -3252,53 +3322,132 @@
               </a:lnSpc>
             </a:pPr>
             <a:r>
-              <a:t>📱 Teams Toolkit - rozwój aplikacji Teams</a:t>
-            </a:r>
-          </a:p>
-          <a:p>
-            <a:pPr>
-              <a:lnSpc>
-                <a:spcPct val="100000"/>
-              </a:lnSpc>
-            </a:pPr>
-            <a:r>
-              <a:t>🐳 Docker - konteneryzacja aplikacji</a:t>
-            </a:r>
-          </a:p>
-          <a:p>
-            <a:pPr>
-              <a:lnSpc>
-                <a:spcPct val="100000"/>
-              </a:lnSpc>
-            </a:pPr>
-            <a:r>
-              <a:t>🔍 GitLens - zaawansowana integracja Git</a:t>
-            </a:r>
-          </a:p>
-          <a:p>
-            <a:pPr>
-              <a:lnSpc>
-                <a:spcPct val="100000"/>
-              </a:lnSpc>
-            </a:pPr>
-            <a:r>
-              <a:t>🔌 Azure DevOps - integracja z Azure DevOps</a:t>
-            </a:r>
-          </a:p>
-          <a:p>
-            <a:pPr>
-              <a:lnSpc>
-                <a:spcPct val="100000"/>
-              </a:lnSpc>
-            </a:pPr>
-            <a:r>
-              <a:t>📊 Application Insights - diagnostyka</a:t>
-            </a:r>
-          </a:p>
-          <a:p>
-            <a:pPr/>
-            <a:r>
-              <a:t>🔧 REST Client - testowanie API</a:t>
+              <a:rPr dirty="0"/>
+              <a:t>📱 Teams Toolkit - </a:t>
+            </a:r>
+            <a:r>
+              <a:rPr dirty="0" err="1"/>
+              <a:t>rozwój</a:t>
+            </a:r>
+            <a:r>
+              <a:rPr dirty="0"/>
+              <a:t> </a:t>
+            </a:r>
+            <a:r>
+              <a:rPr dirty="0" err="1"/>
+              <a:t>aplikacji</a:t>
+            </a:r>
+            <a:r>
+              <a:rPr dirty="0"/>
+              <a:t> Teams</a:t>
+            </a:r>
+          </a:p>
+          <a:p>
+            <a:pPr>
+              <a:lnSpc>
+                <a:spcPct val="100000"/>
+              </a:lnSpc>
+            </a:pPr>
+            <a:r>
+              <a:rPr dirty="0"/>
+              <a:t>🐳 Docker - </a:t>
+            </a:r>
+            <a:r>
+              <a:rPr dirty="0" err="1"/>
+              <a:t>konteneryzacja</a:t>
+            </a:r>
+            <a:r>
+              <a:rPr dirty="0"/>
+              <a:t> </a:t>
+            </a:r>
+            <a:r>
+              <a:rPr dirty="0" err="1"/>
+              <a:t>aplikacji</a:t>
+            </a:r>
+            <a:endParaRPr dirty="0"/>
+          </a:p>
+          <a:p>
+            <a:pPr>
+              <a:lnSpc>
+                <a:spcPct val="100000"/>
+              </a:lnSpc>
+            </a:pPr>
+            <a:r>
+              <a:rPr dirty="0"/>
+              <a:t>🔍 </a:t>
+            </a:r>
+            <a:r>
+              <a:rPr dirty="0" err="1"/>
+              <a:t>GitLens</a:t>
+            </a:r>
+            <a:r>
+              <a:rPr dirty="0"/>
+              <a:t> - </a:t>
+            </a:r>
+            <a:r>
+              <a:rPr dirty="0" err="1"/>
+              <a:t>zaawansowana</a:t>
+            </a:r>
+            <a:r>
+              <a:rPr dirty="0"/>
+              <a:t> </a:t>
+            </a:r>
+            <a:r>
+              <a:rPr dirty="0" err="1"/>
+              <a:t>integracja</a:t>
+            </a:r>
+            <a:r>
+              <a:rPr dirty="0"/>
+              <a:t> Git</a:t>
+            </a:r>
+          </a:p>
+          <a:p>
+            <a:pPr>
+              <a:lnSpc>
+                <a:spcPct val="100000"/>
+              </a:lnSpc>
+            </a:pPr>
+            <a:r>
+              <a:rPr dirty="0"/>
+              <a:t>🔌 Azure DevOps - </a:t>
+            </a:r>
+            <a:r>
+              <a:rPr dirty="0" err="1"/>
+              <a:t>integracja</a:t>
+            </a:r>
+            <a:r>
+              <a:rPr dirty="0"/>
+              <a:t> z Azure DevOps</a:t>
+            </a:r>
+          </a:p>
+          <a:p>
+            <a:pPr>
+              <a:lnSpc>
+                <a:spcPct val="100000"/>
+              </a:lnSpc>
+            </a:pPr>
+            <a:r>
+              <a:rPr dirty="0"/>
+              <a:t>📊 Application Insights - </a:t>
+            </a:r>
+            <a:r>
+              <a:rPr dirty="0" err="1"/>
+              <a:t>diagnostyka</a:t>
+            </a:r>
+            <a:endParaRPr dirty="0"/>
+          </a:p>
+          <a:p>
+            <a:r>
+              <a:rPr dirty="0"/>
+              <a:t>🔧 REST Client - </a:t>
+            </a:r>
+            <a:r>
+              <a:rPr dirty="0" err="1"/>
+              <a:t>testowanie</a:t>
+            </a:r>
+            <a:r>
+              <a:rPr dirty="0"/>
+              <a:t> API</a:t>
             </a:r>
           </a:p>
         </p:txBody>
@@ -3312,7 +3461,7 @@
 </file>
 
 <file path=ppt/slides/slide11.xml><?xml version="1.0" encoding="utf-8"?>
-<p:sld xmlns:a="http://schemas.openxmlformats.org/drawingml/2006/main" xmlns:p="http://schemas.openxmlformats.org/presentationml/2006/main" xmlns:r="http://schemas.openxmlformats.org/officeDocument/2006/relationships">
+<p:sld xmlns:a="http://schemas.openxmlformats.org/drawingml/2006/main" xmlns:r="http://schemas.openxmlformats.org/officeDocument/2006/relationships" xmlns:p="http://schemas.openxmlformats.org/presentationml/2006/main">
   <p:cSld>
     <p:spTree>
       <p:nvGrpSpPr>
@@ -3320,7 +3469,14 @@
         <p:cNvGrpSpPr/>
         <p:nvPr/>
       </p:nvGrpSpPr>
-      <p:grpSpPr/>
+      <p:grpSpPr>
+        <a:xfrm>
+          <a:off x="0" y="0"/>
+          <a:ext cx="0" cy="0"/>
+          <a:chOff x="0" y="0"/>
+          <a:chExt cx="0" cy="0"/>
+        </a:xfrm>
+      </p:grpSpPr>
       <p:sp>
         <p:nvSpPr>
           <p:cNvPr id="2" name="Title 1"/>
@@ -3354,103 +3510,259 @@
         </p:nvSpPr>
         <p:spPr/>
         <p:txBody>
-          <a:bodyPr/>
+          <a:bodyPr>
+            <a:normAutofit/>
+          </a:bodyPr>
           <a:lstStyle/>
-          <a:p/>
-          <a:p>
-            <a:pPr>
-              <a:lnSpc>
-                <a:spcPct val="100000"/>
-              </a:lnSpc>
-            </a:pPr>
-            <a:r>
-              <a:t>🏗️ Krok 1: Klonowanie i konfiguracja projektu</a:t>
-            </a:r>
-          </a:p>
-          <a:p>
-            <a:pPr>
-              <a:lnSpc>
-                <a:spcPct val="100000"/>
-              </a:lnSpc>
-            </a:pPr>
-            <a:r>
-              <a:t>☁️ Krok 2: Setup zasobów Azure (./setup-azure.ps1)</a:t>
-            </a:r>
-          </a:p>
-          <a:p>
-            <a:pPr>
-              <a:lnSpc>
-                <a:spcPct val="100000"/>
-              </a:lnSpc>
-            </a:pPr>
-            <a:r>
-              <a:t>💾 Krok 3: Instalacja zależności (npm, pip)</a:t>
-            </a:r>
-          </a:p>
-          <a:p>
-            <a:pPr>
-              <a:lnSpc>
-                <a:spcPct val="100000"/>
-              </a:lnSpc>
-            </a:pPr>
-            <a:r>
-              <a:t>⚡ Krok 4: Uruchomienie Azure Functions lokalnie</a:t>
-            </a:r>
-          </a:p>
-          <a:p>
-            <a:pPr>
-              <a:lnSpc>
-                <a:spcPct val="100000"/>
-              </a:lnSpc>
-            </a:pPr>
-            <a:r>
-              <a:t>🐍 Krok 5: Test serwerów MCP (Python/TypeScript)</a:t>
-            </a:r>
-          </a:p>
-          <a:p>
-            <a:pPr>
-              <a:lnSpc>
-                <a:spcPct val="100000"/>
-              </a:lnSpc>
-            </a:pPr>
-            <a:r>
-              <a:t>🤖 Krok 6: Konfiguracja i test Teams Bot</a:t>
-            </a:r>
-          </a:p>
-          <a:p>
-            <a:pPr>
-              <a:lnSpc>
-                <a:spcPct val="100000"/>
-              </a:lnSpc>
-            </a:pPr>
-            <a:r>
-              <a:t>📱 Krok 7: Integracja z Microsoft Teams</a:t>
-            </a:r>
-          </a:p>
-          <a:p>
-            <a:pPr>
-              <a:lnSpc>
-                <a:spcPct val="100000"/>
-              </a:lnSpc>
-            </a:pPr>
-            <a:r>
-              <a:t>🚀 Krok 8: Test scenariuszy deployment</a:t>
-            </a:r>
-          </a:p>
-          <a:p>
-            <a:pPr>
-              <a:lnSpc>
-                <a:spcPct val="100000"/>
-              </a:lnSpc>
-            </a:pPr>
-            <a:r>
-              <a:t>🔧 Krok 9: Troubleshooting i optymalizacja</a:t>
-            </a:r>
-          </a:p>
-          <a:p>
-            <a:pPr/>
-            <a:r>
-              <a:t>🎯 Krok 10: Własne rozszerzenia MCP</a:t>
+          <a:p>
+            <a:endParaRPr sz="1800" dirty="0"/>
+          </a:p>
+          <a:p>
+            <a:pPr>
+              <a:lnSpc>
+                <a:spcPct val="100000"/>
+              </a:lnSpc>
+            </a:pPr>
+            <a:r>
+              <a:rPr sz="1800" dirty="0"/>
+              <a:t>🏗️ Krok 1: </a:t>
+            </a:r>
+            <a:r>
+              <a:rPr sz="1800" dirty="0" err="1"/>
+              <a:t>Klonowanie</a:t>
+            </a:r>
+            <a:r>
+              <a:rPr sz="1800" dirty="0"/>
+              <a:t> </a:t>
+            </a:r>
+            <a:r>
+              <a:rPr sz="1800" dirty="0" err="1"/>
+              <a:t>i</a:t>
+            </a:r>
+            <a:r>
+              <a:rPr sz="1800" dirty="0"/>
+              <a:t> </a:t>
+            </a:r>
+            <a:r>
+              <a:rPr sz="1800" dirty="0" err="1"/>
+              <a:t>konfiguracja</a:t>
+            </a:r>
+            <a:r>
+              <a:rPr sz="1800" dirty="0"/>
+              <a:t> </a:t>
+            </a:r>
+            <a:r>
+              <a:rPr sz="1800" dirty="0" err="1"/>
+              <a:t>projektu</a:t>
+            </a:r>
+            <a:endParaRPr sz="1800" dirty="0"/>
+          </a:p>
+          <a:p>
+            <a:pPr>
+              <a:lnSpc>
+                <a:spcPct val="100000"/>
+              </a:lnSpc>
+            </a:pPr>
+            <a:r>
+              <a:rPr sz="1800" dirty="0"/>
+              <a:t>☁️ Krok 2: Setup </a:t>
+            </a:r>
+            <a:r>
+              <a:rPr sz="1800" dirty="0" err="1"/>
+              <a:t>zasobów</a:t>
+            </a:r>
+            <a:r>
+              <a:rPr sz="1800" dirty="0"/>
+              <a:t> Azure (./setup-azure.ps1)</a:t>
+            </a:r>
+          </a:p>
+          <a:p>
+            <a:pPr>
+              <a:lnSpc>
+                <a:spcPct val="100000"/>
+              </a:lnSpc>
+            </a:pPr>
+            <a:r>
+              <a:rPr sz="1800" dirty="0"/>
+              <a:t>💾 Krok 3: </a:t>
+            </a:r>
+            <a:r>
+              <a:rPr sz="1800" dirty="0" err="1"/>
+              <a:t>Instalacja</a:t>
+            </a:r>
+            <a:r>
+              <a:rPr sz="1800" dirty="0"/>
+              <a:t> </a:t>
+            </a:r>
+            <a:r>
+              <a:rPr sz="1800" dirty="0" err="1"/>
+              <a:t>zależności</a:t>
+            </a:r>
+            <a:r>
+              <a:rPr sz="1800" dirty="0"/>
+              <a:t> (</a:t>
+            </a:r>
+            <a:r>
+              <a:rPr sz="1800" dirty="0" err="1"/>
+              <a:t>npm</a:t>
+            </a:r>
+            <a:r>
+              <a:rPr sz="1800" dirty="0"/>
+              <a:t>, pip)</a:t>
+            </a:r>
+          </a:p>
+          <a:p>
+            <a:pPr>
+              <a:lnSpc>
+                <a:spcPct val="100000"/>
+              </a:lnSpc>
+            </a:pPr>
+            <a:r>
+              <a:rPr sz="1800" dirty="0"/>
+              <a:t>⚡ Krok 4: </a:t>
+            </a:r>
+            <a:r>
+              <a:rPr sz="1800" dirty="0" err="1"/>
+              <a:t>Uruchomienie</a:t>
+            </a:r>
+            <a:r>
+              <a:rPr sz="1800" dirty="0"/>
+              <a:t> Azure Functions </a:t>
+            </a:r>
+            <a:r>
+              <a:rPr sz="1800" dirty="0" err="1"/>
+              <a:t>lokalnie</a:t>
+            </a:r>
+            <a:endParaRPr sz="1800" dirty="0"/>
+          </a:p>
+          <a:p>
+            <a:pPr>
+              <a:lnSpc>
+                <a:spcPct val="100000"/>
+              </a:lnSpc>
+            </a:pPr>
+            <a:r>
+              <a:rPr sz="1800" dirty="0"/>
+              <a:t>🐍 Krok 5: Test </a:t>
+            </a:r>
+            <a:r>
+              <a:rPr sz="1800" dirty="0" err="1"/>
+              <a:t>serwerów</a:t>
+            </a:r>
+            <a:r>
+              <a:rPr sz="1800" dirty="0"/>
+              <a:t> MCP (Python/TypeScript)</a:t>
+            </a:r>
+          </a:p>
+          <a:p>
+            <a:pPr>
+              <a:lnSpc>
+                <a:spcPct val="100000"/>
+              </a:lnSpc>
+            </a:pPr>
+            <a:r>
+              <a:rPr sz="1800" dirty="0"/>
+              <a:t>🤖 Krok 6: </a:t>
+            </a:r>
+            <a:r>
+              <a:rPr sz="1800" dirty="0" err="1"/>
+              <a:t>Konfiguracja</a:t>
+            </a:r>
+            <a:r>
+              <a:rPr sz="1800" dirty="0"/>
+              <a:t> </a:t>
+            </a:r>
+            <a:r>
+              <a:rPr sz="1800" dirty="0" err="1"/>
+              <a:t>i</a:t>
+            </a:r>
+            <a:r>
+              <a:rPr sz="1800" dirty="0"/>
+              <a:t> test Teams Bot</a:t>
+            </a:r>
+          </a:p>
+          <a:p>
+            <a:pPr>
+              <a:lnSpc>
+                <a:spcPct val="100000"/>
+              </a:lnSpc>
+            </a:pPr>
+            <a:r>
+              <a:rPr sz="1800" dirty="0"/>
+              <a:t>📱 Krok 7: </a:t>
+            </a:r>
+            <a:r>
+              <a:rPr sz="1800" dirty="0" err="1"/>
+              <a:t>Integracja</a:t>
+            </a:r>
+            <a:r>
+              <a:rPr sz="1800" dirty="0"/>
+              <a:t> z Microsoft Teams</a:t>
+            </a:r>
+          </a:p>
+          <a:p>
+            <a:pPr>
+              <a:lnSpc>
+                <a:spcPct val="100000"/>
+              </a:lnSpc>
+            </a:pPr>
+            <a:r>
+              <a:rPr sz="1800" dirty="0"/>
+              <a:t>🚀 Krok 8: Test </a:t>
+            </a:r>
+            <a:r>
+              <a:rPr sz="1800" dirty="0" err="1"/>
+              <a:t>scenariuszy</a:t>
+            </a:r>
+            <a:r>
+              <a:rPr sz="1800" dirty="0"/>
+              <a:t> deployment</a:t>
+            </a:r>
+          </a:p>
+          <a:p>
+            <a:pPr>
+              <a:lnSpc>
+                <a:spcPct val="100000"/>
+              </a:lnSpc>
+            </a:pPr>
+            <a:r>
+              <a:rPr sz="1800" dirty="0"/>
+              <a:t>🔧 Krok 9: Troubleshooting </a:t>
+            </a:r>
+            <a:r>
+              <a:rPr sz="1800" dirty="0" err="1"/>
+              <a:t>i</a:t>
+            </a:r>
+            <a:r>
+              <a:rPr sz="1800" dirty="0"/>
+              <a:t> </a:t>
+            </a:r>
+            <a:r>
+              <a:rPr sz="1800" dirty="0" err="1"/>
+              <a:t>optymalizacja</a:t>
+            </a:r>
+            <a:endParaRPr sz="1800" dirty="0"/>
+          </a:p>
+          <a:p>
+            <a:r>
+              <a:rPr sz="1800" dirty="0"/>
+              <a:t>🎯 Krok 10: </a:t>
+            </a:r>
+            <a:r>
+              <a:rPr sz="1800" dirty="0" err="1"/>
+              <a:t>Własne</a:t>
+            </a:r>
+            <a:r>
+              <a:rPr sz="1800" dirty="0"/>
+              <a:t> </a:t>
+            </a:r>
+            <a:r>
+              <a:rPr sz="1800" dirty="0" err="1"/>
+              <a:t>rozszerzenia</a:t>
+            </a:r>
+            <a:r>
+              <a:rPr sz="1800" dirty="0"/>
+              <a:t> MCP</a:t>
             </a:r>
           </a:p>
         </p:txBody>
@@ -3464,7 +3776,7 @@
 </file>
 
 <file path=ppt/slides/slide12.xml><?xml version="1.0" encoding="utf-8"?>
-<p:sld xmlns:a="http://schemas.openxmlformats.org/drawingml/2006/main" xmlns:p="http://schemas.openxmlformats.org/presentationml/2006/main" xmlns:r="http://schemas.openxmlformats.org/officeDocument/2006/relationships">
+<p:sld xmlns:a="http://schemas.openxmlformats.org/drawingml/2006/main" xmlns:r="http://schemas.openxmlformats.org/officeDocument/2006/relationships" xmlns:p="http://schemas.openxmlformats.org/presentationml/2006/main">
   <p:cSld>
     <p:spTree>
       <p:nvGrpSpPr>
@@ -3472,7 +3784,14 @@
         <p:cNvGrpSpPr/>
         <p:nvPr/>
       </p:nvGrpSpPr>
-      <p:grpSpPr/>
+      <p:grpSpPr>
+        <a:xfrm>
+          <a:off x="0" y="0"/>
+          <a:ext cx="0" cy="0"/>
+          <a:chOff x="0" y="0"/>
+          <a:chExt cx="0" cy="0"/>
+        </a:xfrm>
+      </p:grpSpPr>
       <p:sp>
         <p:nvSpPr>
           <p:cNvPr id="2" name="Title 1"/>
@@ -3506,26 +3825,56 @@
         </p:nvSpPr>
         <p:spPr/>
         <p:txBody>
-          <a:bodyPr/>
+          <a:bodyPr>
+            <a:normAutofit/>
+          </a:bodyPr>
           <a:lstStyle/>
-          <a:p/>
-          <a:p>
-            <a:pPr>
-              <a:lnSpc>
-                <a:spcPct val="100000"/>
-              </a:lnSpc>
-            </a:pPr>
-            <a:r>
-              <a:t>📚 Eksploruj więcej serwerów MCP:</a:t>
-            </a:r>
-          </a:p>
-          <a:p>
-            <a:pPr>
-              <a:lnSpc>
-                <a:spcPct val="100000"/>
-              </a:lnSpc>
-            </a:pPr>
-            <a:r>
+          <a:p>
+            <a:endParaRPr sz="1800" dirty="0"/>
+          </a:p>
+          <a:p>
+            <a:pPr>
+              <a:lnSpc>
+                <a:spcPct val="100000"/>
+              </a:lnSpc>
+            </a:pPr>
+            <a:r>
+              <a:rPr sz="1800" dirty="0"/>
+              <a:t>📚 </a:t>
+            </a:r>
+            <a:r>
+              <a:rPr sz="1800" dirty="0" err="1"/>
+              <a:t>Eksploruj</a:t>
+            </a:r>
+            <a:r>
+              <a:rPr sz="1800" dirty="0"/>
+              <a:t> </a:t>
+            </a:r>
+            <a:r>
+              <a:rPr sz="1800" dirty="0" err="1"/>
+              <a:t>więcej</a:t>
+            </a:r>
+            <a:r>
+              <a:rPr sz="1800" dirty="0"/>
+              <a:t> </a:t>
+            </a:r>
+            <a:r>
+              <a:rPr sz="1800" dirty="0" err="1"/>
+              <a:t>serwerów</a:t>
+            </a:r>
+            <a:r>
+              <a:rPr sz="1800" dirty="0"/>
+              <a:t> MCP:</a:t>
+            </a:r>
+          </a:p>
+          <a:p>
+            <a:pPr>
+              <a:lnSpc>
+                <a:spcPct val="100000"/>
+              </a:lnSpc>
+            </a:pPr>
+            <a:r>
+              <a:rPr sz="1800" dirty="0"/>
               <a:t>  • GitHub MCP Server</a:t>
             </a:r>
           </a:p>
@@ -3536,6 +3885,7 @@
               </a:lnSpc>
             </a:pPr>
             <a:r>
+              <a:rPr sz="1800" dirty="0"/>
               <a:t>  • Database MCP Server</a:t>
             </a:r>
           </a:p>
@@ -3546,6 +3896,7 @@
               </a:lnSpc>
             </a:pPr>
             <a:r>
+              <a:rPr sz="1800" dirty="0"/>
               <a:t>  • Monitoring MCP Server</a:t>
             </a:r>
           </a:p>
@@ -3556,56 +3907,104 @@
               </a:lnSpc>
             </a:pPr>
             <a:r>
-              <a:t>🌐 Zasoby online:</a:t>
-            </a:r>
-          </a:p>
-          <a:p>
-            <a:pPr>
-              <a:lnSpc>
-                <a:spcPct val="100000"/>
-              </a:lnSpc>
-            </a:pPr>
-            <a:r>
-              <a:t>  • docs.anthropic.com/en/docs/agents-and-tools/mcp</a:t>
-            </a:r>
-          </a:p>
-          <a:p>
-            <a:pPr>
-              <a:lnSpc>
-                <a:spcPct val="100000"/>
-              </a:lnSpc>
-            </a:pPr>
-            <a:r>
-              <a:t>  • github.com/modelcontextprotocol</a:t>
-            </a:r>
-          </a:p>
-          <a:p>
-            <a:pPr>
-              <a:lnSpc>
-                <a:spcPct val="100000"/>
-              </a:lnSpc>
-            </a:pPr>
-            <a:r>
-              <a:t>  • learn.microsoft.com/microsoftteams/platform/</a:t>
-            </a:r>
-          </a:p>
-          <a:p>
-            <a:pPr>
-              <a:lnSpc>
-                <a:spcPct val="100000"/>
-              </a:lnSpc>
-            </a:pPr>
-            <a:r>
-              <a:t>🤝 Społeczność:</a:t>
-            </a:r>
-          </a:p>
-          <a:p>
-            <a:pPr>
-              <a:lnSpc>
-                <a:spcPct val="100000"/>
-              </a:lnSpc>
-            </a:pPr>
-            <a:r>
+              <a:rPr sz="1800" dirty="0"/>
+              <a:t>🌐 </a:t>
+            </a:r>
+            <a:r>
+              <a:rPr sz="1800" dirty="0" err="1"/>
+              <a:t>Zasoby</a:t>
+            </a:r>
+            <a:r>
+              <a:rPr sz="1800" dirty="0"/>
+              <a:t> online:</a:t>
+            </a:r>
+          </a:p>
+          <a:p>
+            <a:pPr>
+              <a:lnSpc>
+                <a:spcPct val="100000"/>
+              </a:lnSpc>
+            </a:pPr>
+            <a:r>
+              <a:rPr sz="1800" dirty="0"/>
+              <a:t>  • docs.anthropic.com/</a:t>
+            </a:r>
+            <a:r>
+              <a:rPr sz="1800" dirty="0" err="1"/>
+              <a:t>en</a:t>
+            </a:r>
+            <a:r>
+              <a:rPr sz="1800" dirty="0"/>
+              <a:t>/docs/agents-and-tools/</a:t>
+            </a:r>
+            <a:r>
+              <a:rPr sz="1800" dirty="0" err="1"/>
+              <a:t>mcp</a:t>
+            </a:r>
+            <a:endParaRPr sz="1800" dirty="0"/>
+          </a:p>
+          <a:p>
+            <a:pPr>
+              <a:lnSpc>
+                <a:spcPct val="100000"/>
+              </a:lnSpc>
+            </a:pPr>
+            <a:r>
+              <a:rPr sz="1800" dirty="0"/>
+              <a:t>  • github.com/</a:t>
+            </a:r>
+            <a:r>
+              <a:rPr sz="1800" dirty="0" err="1"/>
+              <a:t>modelcontextprotocol</a:t>
+            </a:r>
+            <a:endParaRPr sz="1800" dirty="0"/>
+          </a:p>
+          <a:p>
+            <a:pPr>
+              <a:lnSpc>
+                <a:spcPct val="100000"/>
+              </a:lnSpc>
+            </a:pPr>
+            <a:r>
+              <a:rPr sz="1800" dirty="0"/>
+              <a:t>  • learn.microsoft.com/</a:t>
+            </a:r>
+            <a:r>
+              <a:rPr sz="1800" dirty="0" err="1"/>
+              <a:t>microsoftteams</a:t>
+            </a:r>
+            <a:r>
+              <a:rPr sz="1800" dirty="0"/>
+              <a:t>/platform/</a:t>
+            </a:r>
+          </a:p>
+          <a:p>
+            <a:pPr>
+              <a:lnSpc>
+                <a:spcPct val="100000"/>
+              </a:lnSpc>
+            </a:pPr>
+            <a:r>
+              <a:rPr sz="1800" dirty="0"/>
+              <a:t>🤝 </a:t>
+            </a:r>
+            <a:r>
+              <a:rPr sz="1800" dirty="0" err="1"/>
+              <a:t>Społeczność</a:t>
+            </a:r>
+            <a:r>
+              <a:rPr sz="1800" dirty="0"/>
+              <a:t>:</a:t>
+            </a:r>
+          </a:p>
+          <a:p>
+            <a:pPr>
+              <a:lnSpc>
+                <a:spcPct val="100000"/>
+              </a:lnSpc>
+            </a:pPr>
+            <a:r>
+              <a:rPr sz="1800" dirty="0"/>
               <a:t>  • Microsoft 365 Developer Community</a:t>
             </a:r>
           </a:p>
@@ -3616,13 +4015,38 @@
               </a:lnSpc>
             </a:pPr>
             <a:r>
+              <a:rPr sz="1800" dirty="0"/>
               <a:t>  • Azure DevOps Community</a:t>
             </a:r>
           </a:p>
           <a:p>
-            <a:pPr/>
-            <a:r>
-              <a:t>✨ Dziękuję za udział w warsztacie!</a:t>
+            <a:r>
+              <a:rPr sz="1800" dirty="0"/>
+              <a:t>✨ </a:t>
+            </a:r>
+            <a:r>
+              <a:rPr sz="1800" dirty="0" err="1"/>
+              <a:t>Dziękuję</a:t>
+            </a:r>
+            <a:r>
+              <a:rPr sz="1800" dirty="0"/>
+              <a:t> za </a:t>
+            </a:r>
+            <a:r>
+              <a:rPr sz="1800" dirty="0" err="1"/>
+              <a:t>udział</a:t>
+            </a:r>
+            <a:r>
+              <a:rPr sz="1800" dirty="0"/>
+              <a:t> w </a:t>
+            </a:r>
+            <a:r>
+              <a:rPr sz="1800" dirty="0" err="1"/>
+              <a:t>warsztacie</a:t>
+            </a:r>
+            <a:r>
+              <a:rPr sz="1800" dirty="0"/>
+              <a:t>!</a:t>
             </a:r>
           </a:p>
         </p:txBody>
@@ -3636,7 +4060,7 @@
 </file>
 
 <file path=ppt/slides/slide2.xml><?xml version="1.0" encoding="utf-8"?>
-<p:sld xmlns:a="http://schemas.openxmlformats.org/drawingml/2006/main" xmlns:p="http://schemas.openxmlformats.org/presentationml/2006/main" xmlns:r="http://schemas.openxmlformats.org/officeDocument/2006/relationships">
+<p:sld xmlns:a="http://schemas.openxmlformats.org/drawingml/2006/main" xmlns:r="http://schemas.openxmlformats.org/officeDocument/2006/relationships" xmlns:p="http://schemas.openxmlformats.org/presentationml/2006/main">
   <p:cSld>
     <p:spTree>
       <p:nvGrpSpPr>
@@ -3644,7 +4068,14 @@
         <p:cNvGrpSpPr/>
         <p:nvPr/>
       </p:nvGrpSpPr>
-      <p:grpSpPr/>
+      <p:grpSpPr>
+        <a:xfrm>
+          <a:off x="0" y="0"/>
+          <a:ext cx="0" cy="0"/>
+          <a:chOff x="0" y="0"/>
+          <a:chExt cx="0" cy="0"/>
+        </a:xfrm>
+      </p:grpSpPr>
       <p:sp>
         <p:nvSpPr>
           <p:cNvPr id="2" name="Title 1"/>
@@ -3678,94 +4109,241 @@
         </p:nvSpPr>
         <p:spPr/>
         <p:txBody>
-          <a:bodyPr/>
+          <a:bodyPr>
+            <a:normAutofit fontScale="85000" lnSpcReduction="20000"/>
+          </a:bodyPr>
           <a:lstStyle/>
-          <a:p/>
-          <a:p>
-            <a:pPr>
-              <a:lnSpc>
-                <a:spcPct val="100000"/>
-              </a:lnSpc>
-            </a:pPr>
-            <a:r>
-              <a:t>🏗️ Wprowadzenie do Model Context Protocol</a:t>
-            </a:r>
-          </a:p>
-          <a:p>
-            <a:pPr>
-              <a:lnSpc>
-                <a:spcPct val="100000"/>
-              </a:lnSpc>
-            </a:pPr>
-            <a:r>
-              <a:t>☁️ Konfiguracja zasobów Azure</a:t>
-            </a:r>
-          </a:p>
-          <a:p>
-            <a:pPr>
-              <a:lnSpc>
-                <a:spcPct val="100000"/>
-              </a:lnSpc>
-            </a:pPr>
-            <a:r>
-              <a:t>🐍 Implementacja serwerów MCP (Python/TypeScript)</a:t>
-            </a:r>
-          </a:p>
-          <a:p>
-            <a:pPr>
-              <a:lnSpc>
-                <a:spcPct val="100000"/>
-              </a:lnSpc>
-            </a:pPr>
-            <a:r>
-              <a:t>🤖 Integracja z Microsoft Teams Bot</a:t>
-            </a:r>
-          </a:p>
-          <a:p>
-            <a:pPr>
-              <a:lnSpc>
-                <a:spcPct val="100000"/>
-              </a:lnSpc>
-            </a:pPr>
-            <a:r>
-              <a:t>⚡ Azure Functions jako serwer MCP</a:t>
-            </a:r>
-          </a:p>
-          <a:p>
-            <a:pPr>
-              <a:lnSpc>
-                <a:spcPct val="100000"/>
-              </a:lnSpc>
-            </a:pPr>
-            <a:r>
-              <a:t>🛠️ Praktyczne scenariusze DevOps</a:t>
-            </a:r>
-          </a:p>
-          <a:p>
-            <a:pPr>
-              <a:lnSpc>
-                <a:spcPct val="100000"/>
-              </a:lnSpc>
-            </a:pPr>
-            <a:r>
-              <a:t>🔧 Troubleshooting i najlepsze praktyki</a:t>
-            </a:r>
-          </a:p>
-          <a:p>
-            <a:pPr>
-              <a:lnSpc>
-                <a:spcPct val="100000"/>
-              </a:lnSpc>
-            </a:pPr>
-            <a:r>
-              <a:t>🎯 Hands-on laboratorium</a:t>
-            </a:r>
-          </a:p>
-          <a:p>
-            <a:pPr/>
-            <a:r>
-              <a:t>📚 Q&amp;A i dalsze kroki</a:t>
-            </a:r>
+          <a:p>
+            <a:endParaRPr dirty="0"/>
+          </a:p>
+          <a:p>
+            <a:pPr>
+              <a:lnSpc>
+                <a:spcPct val="100000"/>
+              </a:lnSpc>
+            </a:pPr>
+            <a:r>
+              <a:rPr dirty="0"/>
+              <a:t>🏗️ </a:t>
+            </a:r>
+            <a:r>
+              <a:rPr dirty="0" err="1"/>
+              <a:t>Wprowadzenie</a:t>
+            </a:r>
+            <a:r>
+              <a:rPr dirty="0"/>
+              <a:t> do Model Context Protocol</a:t>
+            </a:r>
+          </a:p>
+          <a:p>
+            <a:pPr>
+              <a:lnSpc>
+                <a:spcPct val="100000"/>
+              </a:lnSpc>
+            </a:pPr>
+            <a:r>
+              <a:rPr dirty="0"/>
+              <a:t>☁️ </a:t>
+            </a:r>
+            <a:r>
+              <a:rPr dirty="0" err="1"/>
+              <a:t>Konfiguracja</a:t>
+            </a:r>
+            <a:r>
+              <a:rPr dirty="0"/>
+              <a:t> </a:t>
+            </a:r>
+            <a:r>
+              <a:rPr dirty="0" err="1"/>
+              <a:t>zasobów</a:t>
+            </a:r>
+            <a:r>
+              <a:rPr dirty="0"/>
+              <a:t> Azure</a:t>
+            </a:r>
+          </a:p>
+          <a:p>
+            <a:pPr>
+              <a:lnSpc>
+                <a:spcPct val="100000"/>
+              </a:lnSpc>
+            </a:pPr>
+            <a:r>
+              <a:rPr dirty="0"/>
+              <a:t>🐍 </a:t>
+            </a:r>
+            <a:r>
+              <a:rPr dirty="0" err="1"/>
+              <a:t>Implementacja</a:t>
+            </a:r>
+            <a:r>
+              <a:rPr dirty="0"/>
+              <a:t> </a:t>
+            </a:r>
+            <a:r>
+              <a:rPr dirty="0" err="1"/>
+              <a:t>serwerów</a:t>
+            </a:r>
+            <a:r>
+              <a:rPr dirty="0"/>
+              <a:t> MCP (Python/</a:t>
+            </a:r>
+            <a:r>
+              <a:rPr sz="2700" dirty="0"/>
+              <a:t>TypeScript</a:t>
+            </a:r>
+            <a:r>
+              <a:rPr dirty="0"/>
+              <a:t>)</a:t>
+            </a:r>
+          </a:p>
+          <a:p>
+            <a:pPr>
+              <a:lnSpc>
+                <a:spcPct val="100000"/>
+              </a:lnSpc>
+            </a:pPr>
+            <a:r>
+              <a:rPr dirty="0"/>
+              <a:t>🤖 </a:t>
+            </a:r>
+            <a:r>
+              <a:rPr dirty="0" err="1"/>
+              <a:t>Integracja</a:t>
+            </a:r>
+            <a:r>
+              <a:rPr dirty="0"/>
+              <a:t> z Microsoft Teams Bot</a:t>
+            </a:r>
+          </a:p>
+          <a:p>
+            <a:pPr>
+              <a:lnSpc>
+                <a:spcPct val="100000"/>
+              </a:lnSpc>
+            </a:pPr>
+            <a:r>
+              <a:rPr dirty="0"/>
+              <a:t>⚡ Azure Functions </a:t>
+            </a:r>
+            <a:r>
+              <a:rPr dirty="0" err="1"/>
+              <a:t>jako</a:t>
+            </a:r>
+            <a:r>
+              <a:rPr dirty="0"/>
+              <a:t> </a:t>
+            </a:r>
+            <a:r>
+              <a:rPr dirty="0" err="1"/>
+              <a:t>serwer</a:t>
+            </a:r>
+            <a:r>
+              <a:rPr dirty="0"/>
+              <a:t> MCP</a:t>
+            </a:r>
+          </a:p>
+          <a:p>
+            <a:pPr>
+              <a:lnSpc>
+                <a:spcPct val="100000"/>
+              </a:lnSpc>
+            </a:pPr>
+            <a:r>
+              <a:rPr dirty="0"/>
+              <a:t>🛠️ </a:t>
+            </a:r>
+            <a:r>
+              <a:rPr dirty="0" err="1"/>
+              <a:t>Praktyczne</a:t>
+            </a:r>
+            <a:r>
+              <a:rPr dirty="0"/>
+              <a:t> </a:t>
+            </a:r>
+            <a:r>
+              <a:rPr dirty="0" err="1"/>
+              <a:t>scenariusze</a:t>
+            </a:r>
+            <a:r>
+              <a:rPr dirty="0"/>
+              <a:t> DevOps</a:t>
+            </a:r>
+          </a:p>
+          <a:p>
+            <a:pPr>
+              <a:lnSpc>
+                <a:spcPct val="100000"/>
+              </a:lnSpc>
+            </a:pPr>
+            <a:r>
+              <a:rPr dirty="0"/>
+              <a:t>🔧 Troubleshooting </a:t>
+            </a:r>
+            <a:r>
+              <a:rPr dirty="0" err="1"/>
+              <a:t>i</a:t>
+            </a:r>
+            <a:r>
+              <a:rPr dirty="0"/>
+              <a:t> </a:t>
+            </a:r>
+            <a:r>
+              <a:rPr dirty="0" err="1"/>
+              <a:t>najlepsze</a:t>
+            </a:r>
+            <a:r>
+              <a:rPr dirty="0"/>
+              <a:t> </a:t>
+            </a:r>
+            <a:r>
+              <a:rPr dirty="0" err="1"/>
+              <a:t>praktyki</a:t>
+            </a:r>
+            <a:endParaRPr dirty="0"/>
+          </a:p>
+          <a:p>
+            <a:pPr>
+              <a:lnSpc>
+                <a:spcPct val="100000"/>
+              </a:lnSpc>
+            </a:pPr>
+            <a:r>
+              <a:rPr dirty="0"/>
+              <a:t>🎯 Hands-on </a:t>
+            </a:r>
+            <a:r>
+              <a:rPr dirty="0" err="1"/>
+              <a:t>laboratorium</a:t>
+            </a:r>
+            <a:endParaRPr dirty="0"/>
+          </a:p>
+          <a:p>
+            <a:r>
+              <a:rPr dirty="0"/>
+              <a:t>📚 Q&amp;A </a:t>
+            </a:r>
+            <a:r>
+              <a:rPr dirty="0" err="1"/>
+              <a:t>i</a:t>
+            </a:r>
+            <a:r>
+              <a:rPr dirty="0"/>
+              <a:t> </a:t>
+            </a:r>
+            <a:r>
+              <a:rPr dirty="0" err="1"/>
+              <a:t>dalsze</a:t>
+            </a:r>
+            <a:r>
+              <a:rPr dirty="0"/>
+              <a:t> </a:t>
+            </a:r>
+            <a:r>
+              <a:rPr dirty="0" err="1"/>
+              <a:t>kroki</a:t>
+            </a:r>
+            <a:endParaRPr dirty="0"/>
           </a:p>
         </p:txBody>
       </p:sp>
@@ -3778,7 +4356,7 @@
 </file>
 
 <file path=ppt/slides/slide3.xml><?xml version="1.0" encoding="utf-8"?>
-<p:sld xmlns:a="http://schemas.openxmlformats.org/drawingml/2006/main" xmlns:p="http://schemas.openxmlformats.org/presentationml/2006/main" xmlns:r="http://schemas.openxmlformats.org/officeDocument/2006/relationships">
+<p:sld xmlns:a="http://schemas.openxmlformats.org/drawingml/2006/main" xmlns:r="http://schemas.openxmlformats.org/officeDocument/2006/relationships" xmlns:p="http://schemas.openxmlformats.org/presentationml/2006/main">
   <p:cSld>
     <p:spTree>
       <p:nvGrpSpPr>
@@ -3786,7 +4364,14 @@
         <p:cNvGrpSpPr/>
         <p:nvPr/>
       </p:nvGrpSpPr>
-      <p:grpSpPr/>
+      <p:grpSpPr>
+        <a:xfrm>
+          <a:off x="0" y="0"/>
+          <a:ext cx="0" cy="0"/>
+          <a:chOff x="0" y="0"/>
+          <a:chExt cx="0" cy="0"/>
+        </a:xfrm>
+      </p:grpSpPr>
       <p:sp>
         <p:nvSpPr>
           <p:cNvPr id="2" name="Title 1"/>
@@ -3820,83 +4405,264 @@
         </p:nvSpPr>
         <p:spPr/>
         <p:txBody>
-          <a:bodyPr/>
+          <a:bodyPr>
+            <a:normAutofit fontScale="70000" lnSpcReduction="20000"/>
+          </a:bodyPr>
           <a:lstStyle/>
-          <a:p/>
-          <a:p>
-            <a:pPr>
-              <a:lnSpc>
-                <a:spcPct val="100000"/>
-              </a:lnSpc>
-            </a:pPr>
-            <a:r>
-              <a:t>🔌 Model Context Protocol - natywne wsparcie w ekosystemie Microsoft</a:t>
-            </a:r>
-          </a:p>
-          <a:p>
-            <a:pPr>
-              <a:lnSpc>
-                <a:spcPct val="100000"/>
-              </a:lnSpc>
-            </a:pPr>
-            <a:r>
-              <a:t>🤖 Copilot 365 Tuning - dostosowanie AI do organizacji</a:t>
-            </a:r>
-          </a:p>
-          <a:p>
-            <a:pPr>
-              <a:lnSpc>
-                <a:spcPct val="100000"/>
-              </a:lnSpc>
-            </a:pPr>
-            <a:r>
-              <a:t>🎯 Multi-Agent Orchestration - współpraca wielu agentów AI</a:t>
-            </a:r>
-          </a:p>
-          <a:p>
-            <a:pPr>
-              <a:lnSpc>
-                <a:spcPct val="100000"/>
-              </a:lnSpc>
-            </a:pPr>
-            <a:r>
-              <a:t>📱 Teams AI Library (GA) - uproszczone tworzenie aplikacji AI</a:t>
-            </a:r>
-          </a:p>
-          <a:p>
-            <a:pPr>
-              <a:lnSpc>
-                <a:spcPct val="100000"/>
-              </a:lnSpc>
-            </a:pPr>
-            <a:r>
-              <a:t>🔄 Agent2Agent Protocol (A2A) - bezpieczna komunikacja peer-to-peer</a:t>
-            </a:r>
-          </a:p>
-          <a:p>
-            <a:pPr>
-              <a:lnSpc>
-                <a:spcPct val="100000"/>
-              </a:lnSpc>
-            </a:pPr>
-            <a:r>
-              <a:t>🧠 Pamięć długoterminowa dla ciągłości konwersacji</a:t>
-            </a:r>
-          </a:p>
-          <a:p>
-            <a:pPr>
-              <a:lnSpc>
-                <a:spcPct val="100000"/>
-              </a:lnSpc>
-            </a:pPr>
-            <a:r>
-              <a:t>☁️ Azure AI Foundry - kompleksowa platforma AI</a:t>
-            </a:r>
-          </a:p>
-          <a:p>
-            <a:pPr/>
-            <a:r>
-              <a:t>🌐 Windows 11 AI Platform - lokalny inference</a:t>
+          <a:p>
+            <a:endParaRPr dirty="0"/>
+          </a:p>
+          <a:p>
+            <a:pPr>
+              <a:lnSpc>
+                <a:spcPct val="100000"/>
+              </a:lnSpc>
+            </a:pPr>
+            <a:r>
+              <a:rPr dirty="0"/>
+              <a:t>🔌 Model </a:t>
+            </a:r>
+            <a:r>
+              <a:rPr sz="2300" dirty="0"/>
+              <a:t>Context</a:t>
+            </a:r>
+            <a:r>
+              <a:rPr dirty="0"/>
+              <a:t> Protocol - </a:t>
+            </a:r>
+            <a:r>
+              <a:rPr dirty="0" err="1"/>
+              <a:t>natywne</a:t>
+            </a:r>
+            <a:r>
+              <a:rPr dirty="0"/>
+              <a:t> </a:t>
+            </a:r>
+            <a:r>
+              <a:rPr dirty="0" err="1"/>
+              <a:t>wsparcie</a:t>
+            </a:r>
+            <a:r>
+              <a:rPr dirty="0"/>
+              <a:t> w </a:t>
+            </a:r>
+            <a:r>
+              <a:rPr dirty="0" err="1"/>
+              <a:t>ekosystemie</a:t>
+            </a:r>
+            <a:r>
+              <a:rPr dirty="0"/>
+              <a:t> Microsoft</a:t>
+            </a:r>
+          </a:p>
+          <a:p>
+            <a:pPr>
+              <a:lnSpc>
+                <a:spcPct val="100000"/>
+              </a:lnSpc>
+            </a:pPr>
+            <a:r>
+              <a:rPr dirty="0"/>
+              <a:t>🤖 Copilot 365 Tuning - </a:t>
+            </a:r>
+            <a:r>
+              <a:rPr dirty="0" err="1"/>
+              <a:t>dostosowanie</a:t>
+            </a:r>
+            <a:r>
+              <a:rPr dirty="0"/>
+              <a:t> AI do </a:t>
+            </a:r>
+            <a:r>
+              <a:rPr dirty="0" err="1"/>
+              <a:t>organizacji</a:t>
+            </a:r>
+            <a:endParaRPr dirty="0"/>
+          </a:p>
+          <a:p>
+            <a:pPr>
+              <a:lnSpc>
+                <a:spcPct val="100000"/>
+              </a:lnSpc>
+            </a:pPr>
+            <a:r>
+              <a:rPr dirty="0"/>
+              <a:t>🎯 Multi-Agent Orchestration - </a:t>
+            </a:r>
+            <a:r>
+              <a:rPr dirty="0" err="1"/>
+              <a:t>współpraca</a:t>
+            </a:r>
+            <a:r>
+              <a:rPr dirty="0"/>
+              <a:t> </a:t>
+            </a:r>
+            <a:r>
+              <a:rPr dirty="0" err="1"/>
+              <a:t>wielu</a:t>
+            </a:r>
+            <a:r>
+              <a:rPr dirty="0"/>
+              <a:t> </a:t>
+            </a:r>
+            <a:r>
+              <a:rPr dirty="0" err="1"/>
+              <a:t>agentów</a:t>
+            </a:r>
+            <a:r>
+              <a:rPr dirty="0"/>
+              <a:t> AI</a:t>
+            </a:r>
+          </a:p>
+          <a:p>
+            <a:pPr>
+              <a:lnSpc>
+                <a:spcPct val="100000"/>
+              </a:lnSpc>
+            </a:pPr>
+            <a:r>
+              <a:rPr dirty="0"/>
+              <a:t>📱 Teams AI Library (GA) - </a:t>
+            </a:r>
+            <a:r>
+              <a:rPr dirty="0" err="1"/>
+              <a:t>uproszczone</a:t>
+            </a:r>
+            <a:r>
+              <a:rPr dirty="0"/>
+              <a:t> </a:t>
+            </a:r>
+            <a:r>
+              <a:rPr dirty="0" err="1"/>
+              <a:t>tworzenie</a:t>
+            </a:r>
+            <a:r>
+              <a:rPr dirty="0"/>
+              <a:t> </a:t>
+            </a:r>
+            <a:r>
+              <a:rPr dirty="0" err="1"/>
+              <a:t>aplikacji</a:t>
+            </a:r>
+            <a:r>
+              <a:rPr dirty="0"/>
+              <a:t> AI</a:t>
+            </a:r>
+          </a:p>
+          <a:p>
+            <a:pPr>
+              <a:lnSpc>
+                <a:spcPct val="100000"/>
+              </a:lnSpc>
+            </a:pPr>
+            <a:r>
+              <a:rPr dirty="0"/>
+              <a:t>🔄 Agent2Agent Protocol (A2A) - </a:t>
+            </a:r>
+            <a:r>
+              <a:rPr dirty="0" err="1"/>
+              <a:t>bezpieczna</a:t>
+            </a:r>
+            <a:r>
+              <a:rPr dirty="0"/>
+              <a:t> </a:t>
+            </a:r>
+            <a:r>
+              <a:rPr dirty="0" err="1"/>
+              <a:t>komunikacja</a:t>
+            </a:r>
+            <a:r>
+              <a:rPr dirty="0"/>
+              <a:t> peer-to-peer</a:t>
+            </a:r>
+          </a:p>
+          <a:p>
+            <a:pPr>
+              <a:lnSpc>
+                <a:spcPct val="100000"/>
+              </a:lnSpc>
+            </a:pPr>
+            <a:r>
+              <a:rPr dirty="0"/>
+              <a:t>🧠 </a:t>
+            </a:r>
+            <a:r>
+              <a:rPr dirty="0" err="1"/>
+              <a:t>Pamięć</a:t>
+            </a:r>
+            <a:r>
+              <a:rPr dirty="0"/>
+              <a:t> </a:t>
+            </a:r>
+            <a:r>
+              <a:rPr dirty="0" err="1"/>
+              <a:t>długoterminowa</a:t>
+            </a:r>
+            <a:r>
+              <a:rPr dirty="0"/>
+              <a:t> </a:t>
+            </a:r>
+            <a:r>
+              <a:rPr dirty="0" err="1"/>
+              <a:t>dla</a:t>
+            </a:r>
+            <a:r>
+              <a:rPr dirty="0"/>
+              <a:t> </a:t>
+            </a:r>
+            <a:r>
+              <a:rPr dirty="0" err="1"/>
+              <a:t>ciągłości</a:t>
+            </a:r>
+            <a:r>
+              <a:rPr dirty="0"/>
+              <a:t> </a:t>
+            </a:r>
+            <a:r>
+              <a:rPr dirty="0" err="1"/>
+              <a:t>konwersacji</a:t>
+            </a:r>
+            <a:endParaRPr dirty="0"/>
+          </a:p>
+          <a:p>
+            <a:pPr>
+              <a:lnSpc>
+                <a:spcPct val="100000"/>
+              </a:lnSpc>
+            </a:pPr>
+            <a:r>
+              <a:rPr dirty="0"/>
+              <a:t>☁️ Azure AI Foundry - </a:t>
+            </a:r>
+            <a:r>
+              <a:rPr dirty="0" err="1"/>
+              <a:t>kompleksowa</a:t>
+            </a:r>
+            <a:r>
+              <a:rPr dirty="0"/>
+              <a:t> </a:t>
+            </a:r>
+            <a:r>
+              <a:rPr dirty="0" err="1"/>
+              <a:t>platforma</a:t>
+            </a:r>
+            <a:r>
+              <a:rPr dirty="0"/>
+              <a:t> AI</a:t>
+            </a:r>
+          </a:p>
+          <a:p>
+            <a:r>
+              <a:rPr dirty="0"/>
+              <a:t>🌐 Windows 11 AI Platform - </a:t>
+            </a:r>
+            <a:r>
+              <a:rPr dirty="0" err="1"/>
+              <a:t>lokalny</a:t>
+            </a:r>
+            <a:r>
+              <a:rPr dirty="0"/>
+              <a:t> inference</a:t>
             </a:r>
           </a:p>
         </p:txBody>
@@ -3910,7 +4676,7 @@
 </file>
 
 <file path=ppt/slides/slide4.xml><?xml version="1.0" encoding="utf-8"?>
-<p:sld xmlns:a="http://schemas.openxmlformats.org/drawingml/2006/main" xmlns:p="http://schemas.openxmlformats.org/presentationml/2006/main" xmlns:r="http://schemas.openxmlformats.org/officeDocument/2006/relationships">
+<p:sld xmlns:a="http://schemas.openxmlformats.org/drawingml/2006/main" xmlns:r="http://schemas.openxmlformats.org/officeDocument/2006/relationships" xmlns:p="http://schemas.openxmlformats.org/presentationml/2006/main">
   <p:cSld>
     <p:spTree>
       <p:nvGrpSpPr>
@@ -3918,7 +4684,14 @@
         <p:cNvGrpSpPr/>
         <p:nvPr/>
       </p:nvGrpSpPr>
-      <p:grpSpPr/>
+      <p:grpSpPr>
+        <a:xfrm>
+          <a:off x="0" y="0"/>
+          <a:ext cx="0" cy="0"/>
+          <a:chOff x="0" y="0"/>
+          <a:chExt cx="0" cy="0"/>
+        </a:xfrm>
+      </p:grpSpPr>
       <p:sp>
         <p:nvSpPr>
           <p:cNvPr id="2" name="Title 1"/>
@@ -3952,83 +4725,301 @@
         </p:nvSpPr>
         <p:spPr/>
         <p:txBody>
-          <a:bodyPr/>
+          <a:bodyPr>
+            <a:normAutofit fontScale="85000" lnSpcReduction="10000"/>
+          </a:bodyPr>
           <a:lstStyle/>
-          <a:p/>
-          <a:p>
-            <a:pPr>
-              <a:lnSpc>
-                <a:spcPct val="100000"/>
-              </a:lnSpc>
-            </a:pPr>
-            <a:r>
-              <a:t>🔍 Uniwersalny protokół komunikacji między AI a narzędziami</a:t>
-            </a:r>
-          </a:p>
-          <a:p>
-            <a:pPr>
-              <a:lnSpc>
-                <a:spcPct val="100000"/>
-              </a:lnSpc>
-            </a:pPr>
-            <a:r>
-              <a:t>🚀 Otwarty standard rozwijany przez Anthropic</a:t>
-            </a:r>
-          </a:p>
-          <a:p>
-            <a:pPr>
-              <a:lnSpc>
-                <a:spcPct val="100000"/>
-              </a:lnSpc>
-            </a:pPr>
-            <a:r>
-              <a:t>🔄 Upraszcza integrację zewnętrznych systemów z AI</a:t>
-            </a:r>
-          </a:p>
-          <a:p>
-            <a:pPr>
-              <a:lnSpc>
-                <a:spcPct val="100000"/>
-              </a:lnSpc>
-            </a:pPr>
-            <a:r>
-              <a:t>🛠️ Trzy główne komponenty:</a:t>
-            </a:r>
-          </a:p>
-          <a:p>
-            <a:pPr>
-              <a:lnSpc>
-                <a:spcPct val="100000"/>
-              </a:lnSpc>
-            </a:pPr>
-            <a:r>
-              <a:t>  • Tools - funkcje wywoływane przez AI</a:t>
-            </a:r>
-          </a:p>
-          <a:p>
-            <a:pPr>
-              <a:lnSpc>
-                <a:spcPct val="100000"/>
-              </a:lnSpc>
-            </a:pPr>
-            <a:r>
-              <a:t>  • Resources - źródła danych dostępne dla kontekstu</a:t>
-            </a:r>
-          </a:p>
-          <a:p>
-            <a:pPr>
-              <a:lnSpc>
-                <a:spcPct val="100000"/>
-              </a:lnSpc>
-            </a:pPr>
-            <a:r>
-              <a:t>  • Prompts - predefiniowane szablony interakcji</a:t>
-            </a:r>
-          </a:p>
-          <a:p>
-            <a:pPr/>
-            <a:r>
-              <a:t>⚙️ Architektura: [AI App] ↔️ [MCP Client] ↔️ [MCP Server] ↔️ [External Systems]</a:t>
+          <a:p>
+            <a:endParaRPr dirty="0"/>
+          </a:p>
+          <a:p>
+            <a:pPr>
+              <a:lnSpc>
+                <a:spcPct val="100000"/>
+              </a:lnSpc>
+            </a:pPr>
+            <a:r>
+              <a:rPr dirty="0"/>
+              <a:t>🔍 </a:t>
+            </a:r>
+            <a:r>
+              <a:rPr dirty="0" err="1"/>
+              <a:t>Uniwersalny</a:t>
+            </a:r>
+            <a:r>
+              <a:rPr dirty="0"/>
+              <a:t> </a:t>
+            </a:r>
+            <a:r>
+              <a:rPr dirty="0" err="1"/>
+              <a:t>protokół</a:t>
+            </a:r>
+            <a:r>
+              <a:rPr dirty="0"/>
+              <a:t> </a:t>
+            </a:r>
+            <a:r>
+              <a:rPr dirty="0" err="1"/>
+              <a:t>komunikacji</a:t>
+            </a:r>
+            <a:r>
+              <a:rPr dirty="0"/>
+              <a:t> </a:t>
+            </a:r>
+            <a:r>
+              <a:rPr dirty="0" err="1"/>
+              <a:t>między</a:t>
+            </a:r>
+            <a:r>
+              <a:rPr dirty="0"/>
+              <a:t> AI a </a:t>
+            </a:r>
+            <a:r>
+              <a:rPr sz="800" dirty="0" err="1"/>
+              <a:t>narzędziami</a:t>
+            </a:r>
+            <a:endParaRPr sz="800" dirty="0"/>
+          </a:p>
+          <a:p>
+            <a:pPr>
+              <a:lnSpc>
+                <a:spcPct val="100000"/>
+              </a:lnSpc>
+            </a:pPr>
+            <a:r>
+              <a:rPr dirty="0"/>
+              <a:t>🚀 </a:t>
+            </a:r>
+            <a:r>
+              <a:rPr dirty="0" err="1"/>
+              <a:t>Otwarty</a:t>
+            </a:r>
+            <a:r>
+              <a:rPr dirty="0"/>
+              <a:t> standard </a:t>
+            </a:r>
+            <a:r>
+              <a:rPr dirty="0" err="1"/>
+              <a:t>rozwijany</a:t>
+            </a:r>
+            <a:r>
+              <a:rPr dirty="0"/>
+              <a:t> </a:t>
+            </a:r>
+            <a:r>
+              <a:rPr dirty="0" err="1"/>
+              <a:t>przez</a:t>
+            </a:r>
+            <a:r>
+              <a:rPr dirty="0"/>
+              <a:t> Anthropic</a:t>
+            </a:r>
+          </a:p>
+          <a:p>
+            <a:pPr>
+              <a:lnSpc>
+                <a:spcPct val="100000"/>
+              </a:lnSpc>
+            </a:pPr>
+            <a:r>
+              <a:rPr dirty="0"/>
+              <a:t>🔄 </a:t>
+            </a:r>
+            <a:r>
+              <a:rPr dirty="0" err="1"/>
+              <a:t>Upraszcza</a:t>
+            </a:r>
+            <a:r>
+              <a:rPr dirty="0"/>
+              <a:t> </a:t>
+            </a:r>
+            <a:r>
+              <a:rPr dirty="0" err="1"/>
+              <a:t>integrację</a:t>
+            </a:r>
+            <a:r>
+              <a:rPr dirty="0"/>
+              <a:t> </a:t>
+            </a:r>
+            <a:r>
+              <a:rPr dirty="0" err="1"/>
+              <a:t>zewnętrznych</a:t>
+            </a:r>
+            <a:r>
+              <a:rPr dirty="0"/>
+              <a:t> </a:t>
+            </a:r>
+            <a:r>
+              <a:rPr dirty="0" err="1"/>
+              <a:t>systemów</a:t>
+            </a:r>
+            <a:r>
+              <a:rPr dirty="0"/>
+              <a:t> z AI</a:t>
+            </a:r>
+          </a:p>
+          <a:p>
+            <a:pPr>
+              <a:lnSpc>
+                <a:spcPct val="100000"/>
+              </a:lnSpc>
+            </a:pPr>
+            <a:r>
+              <a:rPr dirty="0"/>
+              <a:t>🛠️ </a:t>
+            </a:r>
+            <a:r>
+              <a:rPr dirty="0" err="1"/>
+              <a:t>Trzy</a:t>
+            </a:r>
+            <a:r>
+              <a:rPr dirty="0"/>
+              <a:t> </a:t>
+            </a:r>
+            <a:r>
+              <a:rPr dirty="0" err="1"/>
+              <a:t>główne</a:t>
+            </a:r>
+            <a:r>
+              <a:rPr dirty="0"/>
+              <a:t> </a:t>
+            </a:r>
+            <a:r>
+              <a:rPr dirty="0" err="1"/>
+              <a:t>komponenty</a:t>
+            </a:r>
+            <a:r>
+              <a:rPr dirty="0"/>
+              <a:t>:</a:t>
+            </a:r>
+          </a:p>
+          <a:p>
+            <a:pPr>
+              <a:lnSpc>
+                <a:spcPct val="100000"/>
+              </a:lnSpc>
+            </a:pPr>
+            <a:r>
+              <a:rPr dirty="0"/>
+              <a:t>  • Tools - </a:t>
+            </a:r>
+            <a:r>
+              <a:rPr dirty="0" err="1"/>
+              <a:t>funkcje</a:t>
+            </a:r>
+            <a:r>
+              <a:rPr dirty="0"/>
+              <a:t> </a:t>
+            </a:r>
+            <a:r>
+              <a:rPr dirty="0" err="1"/>
+              <a:t>wywoływane</a:t>
+            </a:r>
+            <a:r>
+              <a:rPr dirty="0"/>
+              <a:t> </a:t>
+            </a:r>
+            <a:r>
+              <a:rPr dirty="0" err="1"/>
+              <a:t>przez</a:t>
+            </a:r>
+            <a:r>
+              <a:rPr dirty="0"/>
+              <a:t> AI</a:t>
+            </a:r>
+          </a:p>
+          <a:p>
+            <a:pPr>
+              <a:lnSpc>
+                <a:spcPct val="100000"/>
+              </a:lnSpc>
+            </a:pPr>
+            <a:r>
+              <a:rPr dirty="0"/>
+              <a:t>  • Resources - </a:t>
+            </a:r>
+            <a:r>
+              <a:rPr dirty="0" err="1"/>
+              <a:t>źródła</a:t>
+            </a:r>
+            <a:r>
+              <a:rPr dirty="0"/>
+              <a:t> </a:t>
+            </a:r>
+            <a:r>
+              <a:rPr dirty="0" err="1"/>
+              <a:t>danych</a:t>
+            </a:r>
+            <a:r>
+              <a:rPr dirty="0"/>
+              <a:t> </a:t>
+            </a:r>
+            <a:r>
+              <a:rPr dirty="0" err="1"/>
+              <a:t>dostępne</a:t>
+            </a:r>
+            <a:r>
+              <a:rPr dirty="0"/>
+              <a:t> </a:t>
+            </a:r>
+            <a:r>
+              <a:rPr dirty="0" err="1"/>
+              <a:t>dla</a:t>
+            </a:r>
+            <a:r>
+              <a:rPr dirty="0"/>
+              <a:t> </a:t>
+            </a:r>
+            <a:r>
+              <a:rPr dirty="0" err="1"/>
+              <a:t>kontekstu</a:t>
+            </a:r>
+            <a:endParaRPr dirty="0"/>
+          </a:p>
+          <a:p>
+            <a:pPr>
+              <a:lnSpc>
+                <a:spcPct val="100000"/>
+              </a:lnSpc>
+            </a:pPr>
+            <a:r>
+              <a:rPr dirty="0"/>
+              <a:t>  • Prompts - </a:t>
+            </a:r>
+            <a:r>
+              <a:rPr dirty="0" err="1"/>
+              <a:t>predefiniowane</a:t>
+            </a:r>
+            <a:r>
+              <a:rPr dirty="0"/>
+              <a:t> </a:t>
+            </a:r>
+            <a:r>
+              <a:rPr dirty="0" err="1"/>
+              <a:t>szablony</a:t>
+            </a:r>
+            <a:r>
+              <a:rPr dirty="0"/>
+              <a:t> </a:t>
+            </a:r>
+            <a:r>
+              <a:rPr dirty="0" err="1"/>
+              <a:t>interakcji</a:t>
+            </a:r>
+            <a:endParaRPr dirty="0"/>
+          </a:p>
+          <a:p>
+            <a:r>
+              <a:rPr dirty="0"/>
+              <a:t>⚙️ </a:t>
+            </a:r>
+            <a:r>
+              <a:rPr dirty="0" err="1"/>
+              <a:t>Architektura</a:t>
+            </a:r>
+            <a:r>
+              <a:rPr dirty="0"/>
+              <a:t>: [AI App] ↔️ [MCP Client] ↔️ [MCP Server] ↔️ [External Systems]</a:t>
             </a:r>
           </a:p>
         </p:txBody>
@@ -4042,7 +5033,7 @@
 </file>
 
 <file path=ppt/slides/slide5.xml><?xml version="1.0" encoding="utf-8"?>
-<p:sld xmlns:a="http://schemas.openxmlformats.org/drawingml/2006/main" xmlns:p="http://schemas.openxmlformats.org/presentationml/2006/main" xmlns:r="http://schemas.openxmlformats.org/officeDocument/2006/relationships">
+<p:sld xmlns:a="http://schemas.openxmlformats.org/drawingml/2006/main" xmlns:r="http://schemas.openxmlformats.org/officeDocument/2006/relationships" xmlns:p="http://schemas.openxmlformats.org/presentationml/2006/main">
   <p:cSld>
     <p:spTree>
       <p:nvGrpSpPr>
@@ -4050,7 +5041,14 @@
         <p:cNvGrpSpPr/>
         <p:nvPr/>
       </p:nvGrpSpPr>
-      <p:grpSpPr/>
+      <p:grpSpPr>
+        <a:xfrm>
+          <a:off x="0" y="0"/>
+          <a:ext cx="0" cy="0"/>
+          <a:chOff x="0" y="0"/>
+          <a:chExt cx="0" cy="0"/>
+        </a:xfrm>
+      </p:grpSpPr>
       <p:sp>
         <p:nvSpPr>
           <p:cNvPr id="2" name="Title 1"/>
@@ -4084,84 +5082,261 @@
         </p:nvSpPr>
         <p:spPr/>
         <p:txBody>
-          <a:bodyPr/>
+          <a:bodyPr>
+            <a:normAutofit fontScale="85000" lnSpcReduction="10000"/>
+          </a:bodyPr>
           <a:lstStyle/>
-          <a:p/>
-          <a:p>
-            <a:pPr>
-              <a:lnSpc>
-                <a:spcPct val="100000"/>
-              </a:lnSpc>
-            </a:pPr>
-            <a:r>
-              <a:t>📱 Microsoft Teams - interfejs użytkownika</a:t>
-            </a:r>
-          </a:p>
-          <a:p>
-            <a:pPr>
-              <a:lnSpc>
-                <a:spcPct val="100000"/>
-              </a:lnSpc>
-            </a:pPr>
-            <a:r>
-              <a:t>🤖 Teams Bot - obsługa konwersacji i kart adaptacyjnych</a:t>
-            </a:r>
-          </a:p>
-          <a:p>
-            <a:pPr>
-              <a:lnSpc>
-                <a:spcPct val="100000"/>
-              </a:lnSpc>
-            </a:pPr>
-            <a:r>
-              <a:t>⚡ Azure Functions - serwer MCP w chmurze</a:t>
-            </a:r>
-          </a:p>
-          <a:p>
-            <a:pPr>
-              <a:lnSpc>
-                <a:spcPct val="100000"/>
-              </a:lnSpc>
-            </a:pPr>
-            <a:r>
-              <a:t>🐍 Python/TypeScript - lokalne serwery MCP</a:t>
-            </a:r>
-          </a:p>
-          <a:p>
-            <a:pPr>
-              <a:lnSpc>
-                <a:spcPct val="100000"/>
-              </a:lnSpc>
-            </a:pPr>
-            <a:r>
-              <a:t>☁️ Azure AI Services - inteligencja i językowe przetwarzanie</a:t>
-            </a:r>
-          </a:p>
-          <a:p>
-            <a:pPr>
-              <a:lnSpc>
-                <a:spcPct val="100000"/>
-              </a:lnSpc>
-            </a:pPr>
-            <a:r>
-              <a:t>🛠️ Azure DevOps - zarządzanie zadaniami i CI/CD</a:t>
-            </a:r>
-          </a:p>
-          <a:p>
-            <a:pPr>
-              <a:lnSpc>
-                <a:spcPct val="100000"/>
-              </a:lnSpc>
-            </a:pPr>
-            <a:r>
-              <a:t>📊 Application Insights - monitoring i diagnostyka</a:t>
-            </a:r>
-          </a:p>
-          <a:p>
-            <a:pPr/>
-            <a:r>
-              <a:t>💾 Azure Storage - przechowywanie danych i logów</a:t>
-            </a:r>
+          <a:p>
+            <a:endParaRPr dirty="0"/>
+          </a:p>
+          <a:p>
+            <a:pPr>
+              <a:lnSpc>
+                <a:spcPct val="100000"/>
+              </a:lnSpc>
+            </a:pPr>
+            <a:r>
+              <a:rPr dirty="0"/>
+              <a:t>📱 Microsoft Teams - </a:t>
+            </a:r>
+            <a:r>
+              <a:rPr dirty="0" err="1"/>
+              <a:t>interfejs</a:t>
+            </a:r>
+            <a:r>
+              <a:rPr dirty="0"/>
+              <a:t> </a:t>
+            </a:r>
+            <a:r>
+              <a:rPr dirty="0" err="1"/>
+              <a:t>użytkownika</a:t>
+            </a:r>
+            <a:endParaRPr dirty="0"/>
+          </a:p>
+          <a:p>
+            <a:pPr>
+              <a:lnSpc>
+                <a:spcPct val="100000"/>
+              </a:lnSpc>
+            </a:pPr>
+            <a:r>
+              <a:rPr dirty="0"/>
+              <a:t>🤖 Teams Bot - </a:t>
+            </a:r>
+            <a:r>
+              <a:rPr dirty="0" err="1"/>
+              <a:t>obsługa</a:t>
+            </a:r>
+            <a:r>
+              <a:rPr dirty="0"/>
+              <a:t> </a:t>
+            </a:r>
+            <a:r>
+              <a:rPr dirty="0" err="1"/>
+              <a:t>konwersacji</a:t>
+            </a:r>
+            <a:r>
+              <a:rPr dirty="0"/>
+              <a:t> </a:t>
+            </a:r>
+            <a:r>
+              <a:rPr dirty="0" err="1"/>
+              <a:t>i</a:t>
+            </a:r>
+            <a:r>
+              <a:rPr dirty="0"/>
+              <a:t> kart </a:t>
+            </a:r>
+            <a:r>
+              <a:rPr sz="900" dirty="0" err="1"/>
+              <a:t>adaptacyjnych</a:t>
+            </a:r>
+            <a:endParaRPr sz="900" dirty="0"/>
+          </a:p>
+          <a:p>
+            <a:pPr>
+              <a:lnSpc>
+                <a:spcPct val="100000"/>
+              </a:lnSpc>
+            </a:pPr>
+            <a:r>
+              <a:rPr dirty="0"/>
+              <a:t>⚡ Azure Functions - </a:t>
+            </a:r>
+            <a:r>
+              <a:rPr dirty="0" err="1"/>
+              <a:t>serwer</a:t>
+            </a:r>
+            <a:r>
+              <a:rPr dirty="0"/>
+              <a:t> MCP w </a:t>
+            </a:r>
+            <a:r>
+              <a:rPr dirty="0" err="1"/>
+              <a:t>chmurze</a:t>
+            </a:r>
+            <a:endParaRPr dirty="0"/>
+          </a:p>
+          <a:p>
+            <a:pPr>
+              <a:lnSpc>
+                <a:spcPct val="100000"/>
+              </a:lnSpc>
+            </a:pPr>
+            <a:r>
+              <a:rPr dirty="0"/>
+              <a:t>🐍 Python/TypeScript - </a:t>
+            </a:r>
+            <a:r>
+              <a:rPr dirty="0" err="1"/>
+              <a:t>lokalne</a:t>
+            </a:r>
+            <a:r>
+              <a:rPr dirty="0"/>
+              <a:t> </a:t>
+            </a:r>
+            <a:r>
+              <a:rPr dirty="0" err="1"/>
+              <a:t>serwery</a:t>
+            </a:r>
+            <a:r>
+              <a:rPr dirty="0"/>
+              <a:t> MCP</a:t>
+            </a:r>
+          </a:p>
+          <a:p>
+            <a:pPr>
+              <a:lnSpc>
+                <a:spcPct val="100000"/>
+              </a:lnSpc>
+            </a:pPr>
+            <a:r>
+              <a:rPr dirty="0"/>
+              <a:t>☁️ Azure AI Services - </a:t>
+            </a:r>
+            <a:r>
+              <a:rPr dirty="0" err="1"/>
+              <a:t>inteligencja</a:t>
+            </a:r>
+            <a:r>
+              <a:rPr dirty="0"/>
+              <a:t> </a:t>
+            </a:r>
+            <a:r>
+              <a:rPr dirty="0" err="1"/>
+              <a:t>i</a:t>
+            </a:r>
+            <a:r>
+              <a:rPr dirty="0"/>
+              <a:t> </a:t>
+            </a:r>
+            <a:r>
+              <a:rPr dirty="0" err="1"/>
+              <a:t>językowe</a:t>
+            </a:r>
+            <a:r>
+              <a:rPr dirty="0"/>
+              <a:t> </a:t>
+            </a:r>
+            <a:r>
+              <a:rPr dirty="0" err="1"/>
+              <a:t>przetwarzanie</a:t>
+            </a:r>
+            <a:endParaRPr dirty="0"/>
+          </a:p>
+          <a:p>
+            <a:pPr>
+              <a:lnSpc>
+                <a:spcPct val="100000"/>
+              </a:lnSpc>
+            </a:pPr>
+            <a:r>
+              <a:rPr dirty="0"/>
+              <a:t>🛠️ Azure DevOps - </a:t>
+            </a:r>
+            <a:r>
+              <a:rPr dirty="0" err="1"/>
+              <a:t>zarządzanie</a:t>
+            </a:r>
+            <a:r>
+              <a:rPr dirty="0"/>
+              <a:t> </a:t>
+            </a:r>
+            <a:r>
+              <a:rPr dirty="0" err="1"/>
+              <a:t>zadaniami</a:t>
+            </a:r>
+            <a:r>
+              <a:rPr dirty="0"/>
+              <a:t> </a:t>
+            </a:r>
+            <a:r>
+              <a:rPr dirty="0" err="1"/>
+              <a:t>i</a:t>
+            </a:r>
+            <a:r>
+              <a:rPr dirty="0"/>
+              <a:t> CI/CD</a:t>
+            </a:r>
+          </a:p>
+          <a:p>
+            <a:pPr>
+              <a:lnSpc>
+                <a:spcPct val="100000"/>
+              </a:lnSpc>
+            </a:pPr>
+            <a:r>
+              <a:rPr dirty="0"/>
+              <a:t>📊 Application Insights - monitoring </a:t>
+            </a:r>
+            <a:r>
+              <a:rPr dirty="0" err="1"/>
+              <a:t>i</a:t>
+            </a:r>
+            <a:r>
+              <a:rPr dirty="0"/>
+              <a:t> </a:t>
+            </a:r>
+            <a:r>
+              <a:rPr dirty="0" err="1"/>
+              <a:t>diagnostyka</a:t>
+            </a:r>
+            <a:endParaRPr dirty="0"/>
+          </a:p>
+          <a:p>
+            <a:r>
+              <a:rPr dirty="0"/>
+              <a:t>💾 Azure Storage - </a:t>
+            </a:r>
+            <a:r>
+              <a:rPr dirty="0" err="1"/>
+              <a:t>przechowywanie</a:t>
+            </a:r>
+            <a:r>
+              <a:rPr dirty="0"/>
+              <a:t> </a:t>
+            </a:r>
+            <a:r>
+              <a:rPr dirty="0" err="1"/>
+              <a:t>danych</a:t>
+            </a:r>
+            <a:r>
+              <a:rPr dirty="0"/>
+              <a:t> </a:t>
+            </a:r>
+            <a:r>
+              <a:rPr dirty="0" err="1"/>
+              <a:t>i</a:t>
+            </a:r>
+            <a:r>
+              <a:rPr dirty="0"/>
+              <a:t> </a:t>
+            </a:r>
+            <a:r>
+              <a:rPr dirty="0" err="1"/>
+              <a:t>logów</a:t>
+            </a:r>
+            <a:endParaRPr dirty="0"/>
           </a:p>
         </p:txBody>
       </p:sp>
@@ -4174,7 +5349,7 @@
 </file>
 
 <file path=ppt/slides/slide6.xml><?xml version="1.0" encoding="utf-8"?>
-<p:sld xmlns:a="http://schemas.openxmlformats.org/drawingml/2006/main" xmlns:p="http://schemas.openxmlformats.org/presentationml/2006/main" xmlns:r="http://schemas.openxmlformats.org/officeDocument/2006/relationships">
+<p:sld xmlns:a="http://schemas.openxmlformats.org/drawingml/2006/main" xmlns:r="http://schemas.openxmlformats.org/officeDocument/2006/relationships" xmlns:p="http://schemas.openxmlformats.org/presentationml/2006/main">
   <p:cSld>
     <p:spTree>
       <p:nvGrpSpPr>
@@ -4182,7 +5357,14 @@
         <p:cNvGrpSpPr/>
         <p:nvPr/>
       </p:nvGrpSpPr>
-      <p:grpSpPr/>
+      <p:grpSpPr>
+        <a:xfrm>
+          <a:off x="0" y="0"/>
+          <a:ext cx="0" cy="0"/>
+          <a:chOff x="0" y="0"/>
+          <a:chExt cx="0" cy="0"/>
+        </a:xfrm>
+      </p:grpSpPr>
       <p:sp>
         <p:nvSpPr>
           <p:cNvPr id="2" name="Title 1"/>
@@ -4216,83 +5398,189 @@
         </p:nvSpPr>
         <p:spPr/>
         <p:txBody>
-          <a:bodyPr/>
+          <a:bodyPr>
+            <a:normAutofit fontScale="85000" lnSpcReduction="10000"/>
+          </a:bodyPr>
           <a:lstStyle/>
-          <a:p/>
-          <a:p>
-            <a:pPr>
-              <a:lnSpc>
-                <a:spcPct val="100000"/>
-              </a:lnSpc>
-            </a:pPr>
-            <a:r>
-              <a:t>📶 Subskrypcja: 2e539821-ff47-4b8a-9f5a-200de5bb3e8d</a:t>
-            </a:r>
-          </a:p>
-          <a:p>
-            <a:pPr>
-              <a:lnSpc>
-                <a:spcPct val="100000"/>
-              </a:lnSpc>
-            </a:pPr>
-            <a:r>
-              <a:t>📦 Resource Group: copilot-mcp-workshop-rg</a:t>
-            </a:r>
-          </a:p>
-          <a:p>
-            <a:pPr>
-              <a:lnSpc>
-                <a:spcPct val="100000"/>
-              </a:lnSpc>
-            </a:pPr>
-            <a:r>
-              <a:t>🧠 Azure AI Services: copilot-mcp-dev-ai-service</a:t>
-            </a:r>
-          </a:p>
-          <a:p>
-            <a:pPr>
-              <a:lnSpc>
-                <a:spcPct val="100000"/>
-              </a:lnSpc>
-            </a:pPr>
-            <a:r>
-              <a:t>⚡ Azure Functions: copilot-mcp-dev-mcp-func</a:t>
-            </a:r>
-          </a:p>
-          <a:p>
-            <a:pPr>
-              <a:lnSpc>
-                <a:spcPct val="100000"/>
-              </a:lnSpc>
-            </a:pPr>
-            <a:r>
-              <a:t>📊 Application Insights: copilot-mcp-dev-ai</a:t>
-            </a:r>
-          </a:p>
-          <a:p>
-            <a:pPr>
-              <a:lnSpc>
-                <a:spcPct val="100000"/>
-              </a:lnSpc>
-            </a:pPr>
-            <a:r>
-              <a:t>💾 Storage Account: copilotmcpdevst</a:t>
-            </a:r>
-          </a:p>
-          <a:p>
-            <a:pPr>
-              <a:lnSpc>
-                <a:spcPct val="100000"/>
-              </a:lnSpc>
-            </a:pPr>
-            <a:r>
-              <a:t>🤖 Bot Service: copilot-mcp-dev-bot</a:t>
-            </a:r>
-          </a:p>
-          <a:p>
-            <a:pPr/>
-            <a:r>
-              <a:t>🐳 Container Registry: copilotmcpdevacr (opcjonalnie)</a:t>
+          <a:p>
+            <a:endParaRPr dirty="0"/>
+          </a:p>
+          <a:p>
+            <a:pPr>
+              <a:lnSpc>
+                <a:spcPct val="100000"/>
+              </a:lnSpc>
+            </a:pPr>
+            <a:r>
+              <a:rPr dirty="0"/>
+              <a:t>📶 </a:t>
+            </a:r>
+            <a:r>
+              <a:rPr dirty="0" err="1"/>
+              <a:t>Subskrypcja</a:t>
+            </a:r>
+            <a:r>
+              <a:rPr dirty="0"/>
+              <a:t>: 2e539821-ff47-4b8a-9f5a-200de5bb3e8d</a:t>
+            </a:r>
+          </a:p>
+          <a:p>
+            <a:pPr>
+              <a:lnSpc>
+                <a:spcPct val="100000"/>
+              </a:lnSpc>
+            </a:pPr>
+            <a:r>
+              <a:rPr dirty="0"/>
+              <a:t>📦 Resource Group: copilot-</a:t>
+            </a:r>
+            <a:r>
+              <a:rPr dirty="0" err="1"/>
+              <a:t>mcp</a:t>
+            </a:r>
+            <a:r>
+              <a:rPr dirty="0"/>
+              <a:t>-workshop-</a:t>
+            </a:r>
+            <a:r>
+              <a:rPr dirty="0" err="1"/>
+              <a:t>rg</a:t>
+            </a:r>
+            <a:endParaRPr dirty="0"/>
+          </a:p>
+          <a:p>
+            <a:pPr>
+              <a:lnSpc>
+                <a:spcPct val="100000"/>
+              </a:lnSpc>
+            </a:pPr>
+            <a:r>
+              <a:rPr dirty="0"/>
+              <a:t>🧠 Azure AI </a:t>
+            </a:r>
+            <a:r>
+              <a:rPr sz="1100" dirty="0"/>
+              <a:t>Services</a:t>
+            </a:r>
+            <a:r>
+              <a:rPr dirty="0"/>
+              <a:t>: copilot-</a:t>
+            </a:r>
+            <a:r>
+              <a:rPr dirty="0" err="1"/>
+              <a:t>mcp</a:t>
+            </a:r>
+            <a:r>
+              <a:rPr dirty="0"/>
+              <a:t>-dev-ai-service</a:t>
+            </a:r>
+          </a:p>
+          <a:p>
+            <a:pPr>
+              <a:lnSpc>
+                <a:spcPct val="100000"/>
+              </a:lnSpc>
+            </a:pPr>
+            <a:r>
+              <a:rPr dirty="0"/>
+              <a:t>⚡ Azure Functions: copilot-</a:t>
+            </a:r>
+            <a:r>
+              <a:rPr dirty="0" err="1"/>
+              <a:t>mcp</a:t>
+            </a:r>
+            <a:r>
+              <a:rPr dirty="0"/>
+              <a:t>-dev-</a:t>
+            </a:r>
+            <a:r>
+              <a:rPr dirty="0" err="1"/>
+              <a:t>mcp</a:t>
+            </a:r>
+            <a:r>
+              <a:rPr dirty="0"/>
+              <a:t>-</a:t>
+            </a:r>
+            <a:r>
+              <a:rPr dirty="0" err="1"/>
+              <a:t>func</a:t>
+            </a:r>
+            <a:endParaRPr dirty="0"/>
+          </a:p>
+          <a:p>
+            <a:pPr>
+              <a:lnSpc>
+                <a:spcPct val="100000"/>
+              </a:lnSpc>
+            </a:pPr>
+            <a:r>
+              <a:rPr dirty="0"/>
+              <a:t>📊 Application Insights: copilot-</a:t>
+            </a:r>
+            <a:r>
+              <a:rPr dirty="0" err="1"/>
+              <a:t>mcp</a:t>
+            </a:r>
+            <a:r>
+              <a:rPr dirty="0"/>
+              <a:t>-dev-ai</a:t>
+            </a:r>
+          </a:p>
+          <a:p>
+            <a:pPr>
+              <a:lnSpc>
+                <a:spcPct val="100000"/>
+              </a:lnSpc>
+            </a:pPr>
+            <a:r>
+              <a:rPr dirty="0"/>
+              <a:t>💾 Storage Account: </a:t>
+            </a:r>
+            <a:r>
+              <a:rPr dirty="0" err="1"/>
+              <a:t>copilotmcpdevst</a:t>
+            </a:r>
+            <a:endParaRPr dirty="0"/>
+          </a:p>
+          <a:p>
+            <a:pPr>
+              <a:lnSpc>
+                <a:spcPct val="100000"/>
+              </a:lnSpc>
+            </a:pPr>
+            <a:r>
+              <a:rPr dirty="0"/>
+              <a:t>🤖 Bot Service: copilot-</a:t>
+            </a:r>
+            <a:r>
+              <a:rPr dirty="0" err="1"/>
+              <a:t>mcp</a:t>
+            </a:r>
+            <a:r>
+              <a:rPr dirty="0"/>
+              <a:t>-dev-bot</a:t>
+            </a:r>
+          </a:p>
+          <a:p>
+            <a:r>
+              <a:rPr dirty="0"/>
+              <a:t>🐳 Container Registry: </a:t>
+            </a:r>
+            <a:r>
+              <a:rPr dirty="0" err="1"/>
+              <a:t>copilotmcpdevacr</a:t>
+            </a:r>
+            <a:r>
+              <a:rPr dirty="0"/>
+              <a:t> (</a:t>
+            </a:r>
+            <a:r>
+              <a:rPr dirty="0" err="1"/>
+              <a:t>opcjonalnie</a:t>
+            </a:r>
+            <a:r>
+              <a:rPr dirty="0"/>
+              <a:t>)</a:t>
             </a:r>
           </a:p>
         </p:txBody>
@@ -4306,7 +5594,7 @@
 </file>
 
 <file path=ppt/slides/slide7.xml><?xml version="1.0" encoding="utf-8"?>
-<p:sld xmlns:a="http://schemas.openxmlformats.org/drawingml/2006/main" xmlns:p="http://schemas.openxmlformats.org/presentationml/2006/main" xmlns:r="http://schemas.openxmlformats.org/officeDocument/2006/relationships">
+<p:sld xmlns:a="http://schemas.openxmlformats.org/drawingml/2006/main" xmlns:r="http://schemas.openxmlformats.org/officeDocument/2006/relationships" xmlns:p="http://schemas.openxmlformats.org/presentationml/2006/main">
   <p:cSld>
     <p:spTree>
       <p:nvGrpSpPr>
@@ -4314,7 +5602,14 @@
         <p:cNvGrpSpPr/>
         <p:nvPr/>
       </p:nvGrpSpPr>
-      <p:grpSpPr/>
+      <p:grpSpPr>
+        <a:xfrm>
+          <a:off x="0" y="0"/>
+          <a:ext cx="0" cy="0"/>
+          <a:chOff x="0" y="0"/>
+          <a:chExt cx="0" cy="0"/>
+        </a:xfrm>
+      </p:grpSpPr>
       <p:sp>
         <p:nvSpPr>
           <p:cNvPr id="2" name="Title 1"/>
@@ -4348,16 +5643,21 @@
         </p:nvSpPr>
         <p:spPr/>
         <p:txBody>
-          <a:bodyPr/>
+          <a:bodyPr>
+            <a:normAutofit fontScale="70000" lnSpcReduction="20000"/>
+          </a:bodyPr>
           <a:lstStyle/>
-          <a:p/>
-          <a:p>
-            <a:pPr>
-              <a:lnSpc>
-                <a:spcPct val="100000"/>
-              </a:lnSpc>
-            </a:pPr>
-            <a:r>
+          <a:p>
+            <a:endParaRPr dirty="0"/>
+          </a:p>
+          <a:p>
+            <a:pPr>
+              <a:lnSpc>
+                <a:spcPct val="100000"/>
+              </a:lnSpc>
+            </a:pPr>
+            <a:r>
+              <a:rPr dirty="0"/>
               <a:t>⚡ Azure Function MCP Server (JavaScript)</a:t>
             </a:r>
           </a:p>
@@ -4368,26 +5668,53 @@
               </a:lnSpc>
             </a:pPr>
             <a:r>
-              <a:t>  • Deployment aplikacji do Azure</a:t>
-            </a:r>
-          </a:p>
-          <a:p>
-            <a:pPr>
-              <a:lnSpc>
-                <a:spcPct val="100000"/>
-              </a:lnSpc>
-            </a:pPr>
-            <a:r>
-              <a:t>  • Sprawdzanie statusów pipeline</a:t>
-            </a:r>
-          </a:p>
-          <a:p>
-            <a:pPr>
-              <a:lnSpc>
-                <a:spcPct val="100000"/>
-              </a:lnSpc>
-            </a:pPr>
-            <a:r>
+              <a:rPr dirty="0"/>
+              <a:t>  • Deployment </a:t>
+            </a:r>
+            <a:r>
+              <a:rPr dirty="0" err="1"/>
+              <a:t>aplikacji</a:t>
+            </a:r>
+            <a:r>
+              <a:rPr dirty="0"/>
+              <a:t> do Azure</a:t>
+            </a:r>
+          </a:p>
+          <a:p>
+            <a:pPr>
+              <a:lnSpc>
+                <a:spcPct val="100000"/>
+              </a:lnSpc>
+            </a:pPr>
+            <a:r>
+              <a:rPr dirty="0"/>
+              <a:t>  • </a:t>
+            </a:r>
+            <a:r>
+              <a:rPr sz="1500" dirty="0" err="1"/>
+              <a:t>Sprawdzanie</a:t>
+            </a:r>
+            <a:r>
+              <a:rPr dirty="0"/>
+              <a:t> </a:t>
+            </a:r>
+            <a:r>
+              <a:rPr dirty="0" err="1"/>
+              <a:t>statusów</a:t>
+            </a:r>
+            <a:r>
+              <a:rPr dirty="0"/>
+              <a:t> pipeline</a:t>
+            </a:r>
+          </a:p>
+          <a:p>
+            <a:pPr>
+              <a:lnSpc>
+                <a:spcPct val="100000"/>
+              </a:lnSpc>
+            </a:pPr>
+            <a:r>
+              <a:rPr dirty="0"/>
               <a:t>🐍 Local DevOps MCP Server (Python)</a:t>
             </a:r>
           </a:p>
@@ -4398,6 +5725,7 @@
               </a:lnSpc>
             </a:pPr>
             <a:r>
+              <a:rPr dirty="0"/>
               <a:t>  • Docker operations (build, deploy)</a:t>
             </a:r>
           </a:p>
@@ -4408,16 +5736,26 @@
               </a:lnSpc>
             </a:pPr>
             <a:r>
-              <a:t>  • Kubernetes management (kubectl)</a:t>
-            </a:r>
-          </a:p>
-          <a:p>
-            <a:pPr>
-              <a:lnSpc>
-                <a:spcPct val="100000"/>
-              </a:lnSpc>
-            </a:pPr>
-            <a:r>
+              <a:rPr dirty="0"/>
+              <a:t>  • Kubernetes management (</a:t>
+            </a:r>
+            <a:r>
+              <a:rPr dirty="0" err="1"/>
+              <a:t>kubectl</a:t>
+            </a:r>
+            <a:r>
+              <a:rPr dirty="0"/>
+              <a:t>)</a:t>
+            </a:r>
+          </a:p>
+          <a:p>
+            <a:pPr>
+              <a:lnSpc>
+                <a:spcPct val="100000"/>
+              </a:lnSpc>
+            </a:pPr>
+            <a:r>
+              <a:rPr dirty="0"/>
               <a:t>🖥️ Desktop Commander MCP Server (TypeScript)</a:t>
             </a:r>
           </a:p>
@@ -4428,6 +5766,7 @@
               </a:lnSpc>
             </a:pPr>
             <a:r>
+              <a:rPr dirty="0"/>
               <a:t>  • PowerShell commands</a:t>
             </a:r>
           </a:p>
@@ -4438,6 +5777,7 @@
               </a:lnSpc>
             </a:pPr>
             <a:r>
+              <a:rPr dirty="0"/>
               <a:t>  • Windows services management</a:t>
             </a:r>
           </a:p>
@@ -4448,6 +5788,7 @@
               </a:lnSpc>
             </a:pPr>
             <a:r>
+              <a:rPr dirty="0"/>
               <a:t>🚀 Azure DevOps MCP Server (Python)</a:t>
             </a:r>
           </a:p>
@@ -4458,12 +5799,13 @@
               </a:lnSpc>
             </a:pPr>
             <a:r>
+              <a:rPr dirty="0"/>
               <a:t>  • Work items management</a:t>
             </a:r>
           </a:p>
           <a:p>
-            <a:pPr/>
-            <a:r>
+            <a:r>
+              <a:rPr dirty="0"/>
               <a:t>  • CI/CD pipeline operations</a:t>
             </a:r>
           </a:p>
@@ -4478,7 +5820,7 @@
 </file>
 
 <file path=ppt/slides/slide8.xml><?xml version="1.0" encoding="utf-8"?>
-<p:sld xmlns:a="http://schemas.openxmlformats.org/drawingml/2006/main" xmlns:p="http://schemas.openxmlformats.org/presentationml/2006/main" xmlns:r="http://schemas.openxmlformats.org/officeDocument/2006/relationships">
+<p:sld xmlns:a="http://schemas.openxmlformats.org/drawingml/2006/main" xmlns:r="http://schemas.openxmlformats.org/officeDocument/2006/relationships" xmlns:p="http://schemas.openxmlformats.org/presentationml/2006/main">
   <p:cSld>
     <p:spTree>
       <p:nvGrpSpPr>
@@ -4486,7 +5828,14 @@
         <p:cNvGrpSpPr/>
         <p:nvPr/>
       </p:nvGrpSpPr>
-      <p:grpSpPr/>
+      <p:grpSpPr>
+        <a:xfrm>
+          <a:off x="0" y="0"/>
+          <a:ext cx="0" cy="0"/>
+          <a:chOff x="0" y="0"/>
+          <a:chExt cx="0" cy="0"/>
+        </a:xfrm>
+      </p:grpSpPr>
       <p:sp>
         <p:nvSpPr>
           <p:cNvPr id="2" name="Title 1"/>
@@ -4520,46 +5869,123 @@
         </p:nvSpPr>
         <p:spPr/>
         <p:txBody>
-          <a:bodyPr/>
+          <a:bodyPr>
+            <a:normAutofit fontScale="70000" lnSpcReduction="20000"/>
+          </a:bodyPr>
           <a:lstStyle/>
-          <a:p/>
-          <a:p>
-            <a:pPr>
-              <a:lnSpc>
-                <a:spcPct val="100000"/>
-              </a:lnSpc>
-            </a:pPr>
-            <a:r>
-              <a:t>💬 Konwersacyjny interfejs dla operacji DevOps</a:t>
-            </a:r>
-          </a:p>
-          <a:p>
-            <a:pPr>
-              <a:lnSpc>
-                <a:spcPct val="100000"/>
-              </a:lnSpc>
-            </a:pPr>
-            <a:r>
-              <a:t>📊 Adaptacyjne karty z wizualizacją stanu</a:t>
-            </a:r>
-          </a:p>
-          <a:p>
-            <a:pPr>
-              <a:lnSpc>
-                <a:spcPct val="100000"/>
-              </a:lnSpc>
-            </a:pPr>
-            <a:r>
-              <a:t>🚀 Komendy deployment:</a:t>
-            </a:r>
-          </a:p>
-          <a:p>
-            <a:pPr>
-              <a:lnSpc>
-                <a:spcPct val="100000"/>
-              </a:lnSpc>
-            </a:pPr>
-            <a:r>
+          <a:p>
+            <a:endParaRPr dirty="0"/>
+          </a:p>
+          <a:p>
+            <a:pPr>
+              <a:lnSpc>
+                <a:spcPct val="100000"/>
+              </a:lnSpc>
+            </a:pPr>
+            <a:r>
+              <a:rPr dirty="0"/>
+              <a:t>💬 </a:t>
+            </a:r>
+            <a:r>
+              <a:rPr dirty="0" err="1"/>
+              <a:t>Konwersacyjny</a:t>
+            </a:r>
+            <a:r>
+              <a:rPr dirty="0"/>
+              <a:t> </a:t>
+            </a:r>
+            <a:r>
+              <a:rPr dirty="0" err="1"/>
+              <a:t>interfejs</a:t>
+            </a:r>
+            <a:r>
+              <a:rPr dirty="0"/>
+              <a:t> </a:t>
+            </a:r>
+            <a:r>
+              <a:rPr dirty="0" err="1"/>
+              <a:t>dla</a:t>
+            </a:r>
+            <a:r>
+              <a:rPr dirty="0"/>
+              <a:t> </a:t>
+            </a:r>
+            <a:r>
+              <a:rPr dirty="0" err="1"/>
+              <a:t>operacji</a:t>
+            </a:r>
+            <a:r>
+              <a:rPr dirty="0"/>
+              <a:t> DevOps</a:t>
+            </a:r>
+          </a:p>
+          <a:p>
+            <a:pPr>
+              <a:lnSpc>
+                <a:spcPct val="100000"/>
+              </a:lnSpc>
+            </a:pPr>
+            <a:r>
+              <a:rPr dirty="0"/>
+              <a:t>📊 </a:t>
+            </a:r>
+            <a:r>
+              <a:rPr sz="2200" dirty="0" err="1"/>
+              <a:t>Adaptacyjne</a:t>
+            </a:r>
+            <a:r>
+              <a:rPr dirty="0"/>
+              <a:t> </a:t>
+            </a:r>
+            <a:r>
+              <a:rPr dirty="0" err="1"/>
+              <a:t>karty</a:t>
+            </a:r>
+            <a:r>
+              <a:rPr dirty="0"/>
+              <a:t> z </a:t>
+            </a:r>
+            <a:r>
+              <a:rPr dirty="0" err="1"/>
+              <a:t>wizualizacją</a:t>
+            </a:r>
+            <a:r>
+              <a:rPr dirty="0"/>
+              <a:t> </a:t>
+            </a:r>
+            <a:r>
+              <a:rPr dirty="0" err="1"/>
+              <a:t>stanu</a:t>
+            </a:r>
+            <a:endParaRPr dirty="0"/>
+          </a:p>
+          <a:p>
+            <a:pPr>
+              <a:lnSpc>
+                <a:spcPct val="100000"/>
+              </a:lnSpc>
+            </a:pPr>
+            <a:r>
+              <a:rPr dirty="0"/>
+              <a:t>🚀 </a:t>
+            </a:r>
+            <a:r>
+              <a:rPr dirty="0" err="1"/>
+              <a:t>Komendy</a:t>
+            </a:r>
+            <a:r>
+              <a:rPr dirty="0"/>
+              <a:t> deployment:</a:t>
+            </a:r>
+          </a:p>
+          <a:p>
+            <a:pPr>
+              <a:lnSpc>
+                <a:spcPct val="100000"/>
+              </a:lnSpc>
+            </a:pPr>
+            <a:r>
+              <a:rPr dirty="0"/>
               <a:t>  • 'deploy v2.1.0 do staging'</a:t>
             </a:r>
           </a:p>
@@ -4570,6 +5996,7 @@
               </a:lnSpc>
             </a:pPr>
             <a:r>
+              <a:rPr dirty="0"/>
               <a:t>  • 'status pipeline 123'</a:t>
             </a:r>
           </a:p>
@@ -4580,64 +6007,168 @@
               </a:lnSpc>
             </a:pPr>
             <a:r>
-              <a:t>📝 Zarządzanie zadaniami:</a:t>
-            </a:r>
-          </a:p>
-          <a:p>
-            <a:pPr>
-              <a:lnSpc>
-                <a:spcPct val="100000"/>
-              </a:lnSpc>
-            </a:pPr>
-            <a:r>
-              <a:t>  • 'utwórz zadanie: Fix bug @john.doe'</a:t>
-            </a:r>
-          </a:p>
-          <a:p>
-            <a:pPr>
-              <a:lnSpc>
-                <a:spcPct val="100000"/>
-              </a:lnSpc>
-            </a:pPr>
-            <a:r>
-              <a:t>  • 'sprawdź zadania w sprint'</a:t>
-            </a:r>
-          </a:p>
-          <a:p>
-            <a:pPr>
-              <a:lnSpc>
-                <a:spcPct val="100000"/>
-              </a:lnSpc>
-            </a:pPr>
-            <a:r>
-              <a:t>🖥️ Komendy systemowe:</a:t>
-            </a:r>
-          </a:p>
-          <a:p>
-            <a:pPr>
-              <a:lnSpc>
-                <a:spcPct val="100000"/>
-              </a:lnSpc>
-            </a:pPr>
-            <a:r>
-              <a:t>  • 'uruchom docker ps'</a:t>
-            </a:r>
-          </a:p>
-          <a:p>
-            <a:pPr>
-              <a:lnSpc>
-                <a:spcPct val="100000"/>
-              </a:lnSpc>
-            </a:pPr>
-            <a:r>
+              <a:rPr dirty="0"/>
+              <a:t>📝 </a:t>
+            </a:r>
+            <a:r>
+              <a:rPr dirty="0" err="1"/>
+              <a:t>Zarządzanie</a:t>
+            </a:r>
+            <a:r>
+              <a:rPr dirty="0"/>
+              <a:t> </a:t>
+            </a:r>
+            <a:r>
+              <a:rPr dirty="0" err="1"/>
+              <a:t>zadaniami</a:t>
+            </a:r>
+            <a:r>
+              <a:rPr dirty="0"/>
+              <a:t>:</a:t>
+            </a:r>
+          </a:p>
+          <a:p>
+            <a:pPr>
+              <a:lnSpc>
+                <a:spcPct val="100000"/>
+              </a:lnSpc>
+            </a:pPr>
+            <a:r>
+              <a:rPr dirty="0"/>
+              <a:t>  • '</a:t>
+            </a:r>
+            <a:r>
+              <a:rPr dirty="0" err="1"/>
+              <a:t>utwórz</a:t>
+            </a:r>
+            <a:r>
+              <a:rPr dirty="0"/>
+              <a:t> </a:t>
+            </a:r>
+            <a:r>
+              <a:rPr dirty="0" err="1"/>
+              <a:t>zadanie</a:t>
+            </a:r>
+            <a:r>
+              <a:rPr dirty="0"/>
+              <a:t>: Fix bug @john.doe'</a:t>
+            </a:r>
+          </a:p>
+          <a:p>
+            <a:pPr>
+              <a:lnSpc>
+                <a:spcPct val="100000"/>
+              </a:lnSpc>
+            </a:pPr>
+            <a:r>
+              <a:rPr dirty="0"/>
+              <a:t>  • '</a:t>
+            </a:r>
+            <a:r>
+              <a:rPr dirty="0" err="1"/>
+              <a:t>sprawdź</a:t>
+            </a:r>
+            <a:r>
+              <a:rPr dirty="0"/>
+              <a:t> </a:t>
+            </a:r>
+            <a:r>
+              <a:rPr dirty="0" err="1"/>
+              <a:t>zadania</a:t>
+            </a:r>
+            <a:r>
+              <a:rPr dirty="0"/>
+              <a:t> w sprint'</a:t>
+            </a:r>
+          </a:p>
+          <a:p>
+            <a:pPr>
+              <a:lnSpc>
+                <a:spcPct val="100000"/>
+              </a:lnSpc>
+            </a:pPr>
+            <a:r>
+              <a:rPr dirty="0"/>
+              <a:t>🖥️ </a:t>
+            </a:r>
+            <a:r>
+              <a:rPr dirty="0" err="1"/>
+              <a:t>Komendy</a:t>
+            </a:r>
+            <a:r>
+              <a:rPr dirty="0"/>
+              <a:t> </a:t>
+            </a:r>
+            <a:r>
+              <a:rPr dirty="0" err="1"/>
+              <a:t>systemowe</a:t>
+            </a:r>
+            <a:r>
+              <a:rPr dirty="0"/>
+              <a:t>:</a:t>
+            </a:r>
+          </a:p>
+          <a:p>
+            <a:pPr>
+              <a:lnSpc>
+                <a:spcPct val="100000"/>
+              </a:lnSpc>
+            </a:pPr>
+            <a:r>
+              <a:rPr dirty="0"/>
+              <a:t>  • '</a:t>
+            </a:r>
+            <a:r>
+              <a:rPr dirty="0" err="1"/>
+              <a:t>uruchom</a:t>
+            </a:r>
+            <a:r>
+              <a:rPr dirty="0"/>
+              <a:t> docker </a:t>
+            </a:r>
+            <a:r>
+              <a:rPr dirty="0" err="1"/>
+              <a:t>ps'</a:t>
+            </a:r>
+            <a:endParaRPr dirty="0"/>
+          </a:p>
+          <a:p>
+            <a:pPr>
+              <a:lnSpc>
+                <a:spcPct val="100000"/>
+              </a:lnSpc>
+            </a:pPr>
+            <a:r>
+              <a:rPr dirty="0"/>
               <a:t>  • 'restart service nginx'</a:t>
             </a:r>
           </a:p>
           <a:p>
-            <a:pPr/>
-            <a:r>
-              <a:t>🔔 Real-time powiadomienia o statusie operacji</a:t>
-            </a:r>
+            <a:r>
+              <a:rPr dirty="0"/>
+              <a:t>🔔 Real-time </a:t>
+            </a:r>
+            <a:r>
+              <a:rPr dirty="0" err="1"/>
+              <a:t>powiadomienia</a:t>
+            </a:r>
+            <a:r>
+              <a:rPr dirty="0"/>
+              <a:t> o </a:t>
+            </a:r>
+            <a:r>
+              <a:rPr dirty="0" err="1"/>
+              <a:t>statusie</a:t>
+            </a:r>
+            <a:r>
+              <a:rPr dirty="0"/>
+              <a:t> </a:t>
+            </a:r>
+            <a:r>
+              <a:rPr dirty="0" err="1"/>
+              <a:t>operacji</a:t>
+            </a:r>
+            <a:endParaRPr dirty="0"/>
           </a:p>
         </p:txBody>
       </p:sp>
@@ -4650,7 +6181,7 @@
 </file>
 
 <file path=ppt/slides/slide9.xml><?xml version="1.0" encoding="utf-8"?>
-<p:sld xmlns:a="http://schemas.openxmlformats.org/drawingml/2006/main" xmlns:p="http://schemas.openxmlformats.org/presentationml/2006/main" xmlns:r="http://schemas.openxmlformats.org/officeDocument/2006/relationships">
+<p:sld xmlns:a="http://schemas.openxmlformats.org/drawingml/2006/main" xmlns:r="http://schemas.openxmlformats.org/officeDocument/2006/relationships" xmlns:p="http://schemas.openxmlformats.org/presentationml/2006/main">
   <p:cSld>
     <p:spTree>
       <p:nvGrpSpPr>
@@ -4658,7 +6189,14 @@
         <p:cNvGrpSpPr/>
         <p:nvPr/>
       </p:nvGrpSpPr>
-      <p:grpSpPr/>
+      <p:grpSpPr>
+        <a:xfrm>
+          <a:off x="0" y="0"/>
+          <a:ext cx="0" cy="0"/>
+          <a:chOff x="0" y="0"/>
+          <a:chExt cx="0" cy="0"/>
+        </a:xfrm>
+      </p:grpSpPr>
       <p:sp>
         <p:nvSpPr>
           <p:cNvPr id="2" name="Title 1"/>
@@ -4692,26 +6230,48 @@
         </p:nvSpPr>
         <p:spPr/>
         <p:txBody>
-          <a:bodyPr/>
+          <a:bodyPr>
+            <a:normAutofit fontScale="70000" lnSpcReduction="20000"/>
+          </a:bodyPr>
           <a:lstStyle/>
-          <a:p/>
-          <a:p>
-            <a:pPr>
-              <a:lnSpc>
-                <a:spcPct val="100000"/>
-              </a:lnSpc>
-            </a:pPr>
-            <a:r>
-              <a:t>🚀 Scenariusz 1: Automatyczny deployment</a:t>
-            </a:r>
-          </a:p>
-          <a:p>
-            <a:pPr>
-              <a:lnSpc>
-                <a:spcPct val="100000"/>
-              </a:lnSpc>
-            </a:pPr>
-            <a:r>
+          <a:p>
+            <a:endParaRPr dirty="0"/>
+          </a:p>
+          <a:p>
+            <a:pPr>
+              <a:lnSpc>
+                <a:spcPct val="100000"/>
+              </a:lnSpc>
+            </a:pPr>
+            <a:r>
+              <a:rPr dirty="0"/>
+              <a:t>🚀 </a:t>
+            </a:r>
+            <a:r>
+              <a:rPr dirty="0" err="1"/>
+              <a:t>Scenariusz</a:t>
+            </a:r>
+            <a:r>
+              <a:rPr dirty="0"/>
+              <a:t> 1: </a:t>
+            </a:r>
+            <a:r>
+              <a:rPr dirty="0" err="1"/>
+              <a:t>Automatyczny</a:t>
+            </a:r>
+            <a:r>
+              <a:rPr dirty="0"/>
+              <a:t> deployment</a:t>
+            </a:r>
+          </a:p>
+          <a:p>
+            <a:pPr>
+              <a:lnSpc>
+                <a:spcPct val="100000"/>
+              </a:lnSpc>
+            </a:pPr>
+            <a:r>
+              <a:rPr dirty="0"/>
               <a:t>  • 'deploy v2.1.0 do staging' → Real-time monitoring</a:t>
             </a:r>
           </a:p>
@@ -4722,84 +6282,302 @@
               </a:lnSpc>
             </a:pPr>
             <a:r>
-              <a:t>📊 Scenariusz 2: Inteligentne monitorowanie</a:t>
-            </a:r>
-          </a:p>
-          <a:p>
-            <a:pPr>
-              <a:lnSpc>
-                <a:spcPct val="100000"/>
-              </a:lnSpc>
-            </a:pPr>
-            <a:r>
-              <a:t>  • Auto-remediacja przy alertach</a:t>
-            </a:r>
-          </a:p>
-          <a:p>
-            <a:pPr>
-              <a:lnSpc>
-                <a:spcPct val="100000"/>
-              </a:lnSpc>
-            </a:pPr>
-            <a:r>
-              <a:t>  • Skalowanie zasobów na podstawie metryki</a:t>
-            </a:r>
-          </a:p>
-          <a:p>
-            <a:pPr>
-              <a:lnSpc>
-                <a:spcPct val="100000"/>
-              </a:lnSpc>
-            </a:pPr>
-            <a:r>
-              <a:t>🛠️ Scenariusz 3: GitOps z konwersacyjnym AI</a:t>
-            </a:r>
-          </a:p>
-          <a:p>
-            <a:pPr>
-              <a:lnSpc>
-                <a:spcPct val="100000"/>
-              </a:lnSpc>
-            </a:pPr>
-            <a:r>
-              <a:t>  • 'Potrzebuję klastra K8s z 3 nodami'</a:t>
-            </a:r>
-          </a:p>
-          <a:p>
-            <a:pPr>
-              <a:lnSpc>
-                <a:spcPct val="100000"/>
-              </a:lnSpc>
-            </a:pPr>
-            <a:r>
-              <a:t>  • Generowanie kodu Terraform</a:t>
-            </a:r>
-          </a:p>
-          <a:p>
-            <a:pPr>
-              <a:lnSpc>
-                <a:spcPct val="100000"/>
-              </a:lnSpc>
-            </a:pPr>
-            <a:r>
-              <a:t>📝 Scenariusz 4: Zarządzanie incydentami</a:t>
-            </a:r>
-          </a:p>
-          <a:p>
-            <a:pPr>
-              <a:lnSpc>
-                <a:spcPct val="100000"/>
-              </a:lnSpc>
-            </a:pPr>
-            <a:r>
-              <a:t>  • Tworzenie zadań z alertami</a:t>
-            </a:r>
-          </a:p>
-          <a:p>
-            <a:pPr/>
-            <a:r>
-              <a:t>  • Automatyczne przypisywanie zespołów</a:t>
-            </a:r>
+              <a:rPr dirty="0"/>
+              <a:t>📊 </a:t>
+            </a:r>
+            <a:r>
+              <a:rPr dirty="0" err="1"/>
+              <a:t>Scenariusz</a:t>
+            </a:r>
+            <a:r>
+              <a:rPr dirty="0"/>
+              <a:t> 2: </a:t>
+            </a:r>
+            <a:r>
+              <a:rPr dirty="0" err="1"/>
+              <a:t>Inteligentne</a:t>
+            </a:r>
+            <a:r>
+              <a:rPr dirty="0"/>
+              <a:t> </a:t>
+            </a:r>
+            <a:r>
+              <a:rPr dirty="0" err="1"/>
+              <a:t>monitorowanie</a:t>
+            </a:r>
+            <a:endParaRPr dirty="0"/>
+          </a:p>
+          <a:p>
+            <a:pPr>
+              <a:lnSpc>
+                <a:spcPct val="100000"/>
+              </a:lnSpc>
+            </a:pPr>
+            <a:r>
+              <a:rPr dirty="0"/>
+              <a:t>  • </a:t>
+            </a:r>
+            <a:r>
+              <a:rPr sz="1400" dirty="0"/>
+              <a:t>Auto-</a:t>
+            </a:r>
+            <a:r>
+              <a:rPr sz="1400" dirty="0" err="1"/>
+              <a:t>remediacja</a:t>
+            </a:r>
+            <a:r>
+              <a:rPr dirty="0"/>
+              <a:t> </a:t>
+            </a:r>
+            <a:r>
+              <a:rPr dirty="0" err="1"/>
+              <a:t>przy</a:t>
+            </a:r>
+            <a:r>
+              <a:rPr dirty="0"/>
+              <a:t> </a:t>
+            </a:r>
+            <a:r>
+              <a:rPr dirty="0" err="1"/>
+              <a:t>alertach</a:t>
+            </a:r>
+            <a:endParaRPr dirty="0"/>
+          </a:p>
+          <a:p>
+            <a:pPr>
+              <a:lnSpc>
+                <a:spcPct val="100000"/>
+              </a:lnSpc>
+            </a:pPr>
+            <a:r>
+              <a:rPr dirty="0"/>
+              <a:t>  • </a:t>
+            </a:r>
+            <a:r>
+              <a:rPr dirty="0" err="1"/>
+              <a:t>Skalowanie</a:t>
+            </a:r>
+            <a:r>
+              <a:rPr dirty="0"/>
+              <a:t> </a:t>
+            </a:r>
+            <a:r>
+              <a:rPr dirty="0" err="1"/>
+              <a:t>zasobów</a:t>
+            </a:r>
+            <a:r>
+              <a:rPr dirty="0"/>
+              <a:t> </a:t>
+            </a:r>
+            <a:r>
+              <a:rPr dirty="0" err="1"/>
+              <a:t>na</a:t>
+            </a:r>
+            <a:r>
+              <a:rPr dirty="0"/>
+              <a:t> </a:t>
+            </a:r>
+            <a:r>
+              <a:rPr dirty="0" err="1"/>
+              <a:t>podstawie</a:t>
+            </a:r>
+            <a:r>
+              <a:rPr dirty="0"/>
+              <a:t> </a:t>
+            </a:r>
+            <a:r>
+              <a:rPr dirty="0" err="1"/>
+              <a:t>metryki</a:t>
+            </a:r>
+            <a:endParaRPr dirty="0"/>
+          </a:p>
+          <a:p>
+            <a:pPr>
+              <a:lnSpc>
+                <a:spcPct val="100000"/>
+              </a:lnSpc>
+            </a:pPr>
+            <a:r>
+              <a:rPr dirty="0"/>
+              <a:t>🛠️ </a:t>
+            </a:r>
+            <a:r>
+              <a:rPr dirty="0" err="1"/>
+              <a:t>Scenariusz</a:t>
+            </a:r>
+            <a:r>
+              <a:rPr dirty="0"/>
+              <a:t> 3: </a:t>
+            </a:r>
+            <a:r>
+              <a:rPr dirty="0" err="1"/>
+              <a:t>GitOps</a:t>
+            </a:r>
+            <a:r>
+              <a:rPr dirty="0"/>
+              <a:t> z </a:t>
+            </a:r>
+            <a:r>
+              <a:rPr dirty="0" err="1"/>
+              <a:t>konwersacyjnym</a:t>
+            </a:r>
+            <a:r>
+              <a:rPr dirty="0"/>
+              <a:t> AI</a:t>
+            </a:r>
+          </a:p>
+          <a:p>
+            <a:pPr>
+              <a:lnSpc>
+                <a:spcPct val="100000"/>
+              </a:lnSpc>
+            </a:pPr>
+            <a:r>
+              <a:rPr dirty="0"/>
+              <a:t>  • '</a:t>
+            </a:r>
+            <a:r>
+              <a:rPr dirty="0" err="1"/>
+              <a:t>Potrzebuję</a:t>
+            </a:r>
+            <a:r>
+              <a:rPr dirty="0"/>
+              <a:t> </a:t>
+            </a:r>
+            <a:r>
+              <a:rPr dirty="0" err="1"/>
+              <a:t>klastra</a:t>
+            </a:r>
+            <a:r>
+              <a:rPr dirty="0"/>
+              <a:t> K8s z 3 </a:t>
+            </a:r>
+            <a:r>
+              <a:rPr dirty="0" err="1"/>
+              <a:t>nodami</a:t>
+            </a:r>
+            <a:r>
+              <a:rPr dirty="0"/>
+              <a:t>'</a:t>
+            </a:r>
+          </a:p>
+          <a:p>
+            <a:pPr>
+              <a:lnSpc>
+                <a:spcPct val="100000"/>
+              </a:lnSpc>
+            </a:pPr>
+            <a:r>
+              <a:rPr dirty="0"/>
+              <a:t>  • </a:t>
+            </a:r>
+            <a:r>
+              <a:rPr dirty="0" err="1"/>
+              <a:t>Generowanie</a:t>
+            </a:r>
+            <a:r>
+              <a:rPr dirty="0"/>
+              <a:t> </a:t>
+            </a:r>
+            <a:r>
+              <a:rPr dirty="0" err="1"/>
+              <a:t>kodu</a:t>
+            </a:r>
+            <a:r>
+              <a:rPr dirty="0"/>
+              <a:t> Terraform</a:t>
+            </a:r>
+          </a:p>
+          <a:p>
+            <a:pPr>
+              <a:lnSpc>
+                <a:spcPct val="100000"/>
+              </a:lnSpc>
+            </a:pPr>
+            <a:r>
+              <a:rPr dirty="0"/>
+              <a:t>📝 </a:t>
+            </a:r>
+            <a:r>
+              <a:rPr dirty="0" err="1"/>
+              <a:t>Scenariusz</a:t>
+            </a:r>
+            <a:r>
+              <a:rPr dirty="0"/>
+              <a:t> 4: </a:t>
+            </a:r>
+            <a:r>
+              <a:rPr dirty="0" err="1"/>
+              <a:t>Zarządzanie</a:t>
+            </a:r>
+            <a:r>
+              <a:rPr dirty="0"/>
+              <a:t> </a:t>
+            </a:r>
+            <a:r>
+              <a:rPr dirty="0" err="1"/>
+              <a:t>incydentami</a:t>
+            </a:r>
+            <a:endParaRPr dirty="0"/>
+          </a:p>
+          <a:p>
+            <a:pPr>
+              <a:lnSpc>
+                <a:spcPct val="100000"/>
+              </a:lnSpc>
+            </a:pPr>
+            <a:r>
+              <a:rPr dirty="0"/>
+              <a:t>  • </a:t>
+            </a:r>
+            <a:r>
+              <a:rPr dirty="0" err="1"/>
+              <a:t>Tworzenie</a:t>
+            </a:r>
+            <a:r>
+              <a:rPr dirty="0"/>
+              <a:t> </a:t>
+            </a:r>
+            <a:r>
+              <a:rPr dirty="0" err="1"/>
+              <a:t>zadań</a:t>
+            </a:r>
+            <a:r>
+              <a:rPr dirty="0"/>
+              <a:t> z </a:t>
+            </a:r>
+            <a:r>
+              <a:rPr dirty="0" err="1"/>
+              <a:t>alertami</a:t>
+            </a:r>
+            <a:endParaRPr dirty="0"/>
+          </a:p>
+          <a:p>
+            <a:r>
+              <a:rPr dirty="0"/>
+              <a:t>  • </a:t>
+            </a:r>
+            <a:r>
+              <a:rPr dirty="0" err="1"/>
+              <a:t>Automatyczne</a:t>
+            </a:r>
+            <a:r>
+              <a:rPr dirty="0"/>
+              <a:t> </a:t>
+            </a:r>
+            <a:r>
+              <a:rPr dirty="0" err="1"/>
+              <a:t>przypisywanie</a:t>
+            </a:r>
+            <a:r>
+              <a:rPr dirty="0"/>
+              <a:t> </a:t>
+            </a:r>
+            <a:r>
+              <a:rPr dirty="0" err="1"/>
+              <a:t>zespołów</a:t>
+            </a:r>
+            <a:endParaRPr dirty="0"/>
           </a:p>
         </p:txBody>
       </p:sp>

</xml_diff>